<commit_message>
feat(presentation): update UML diagrams and add new draw.io file for project documentation feat(presentation): add combined PDF of UML diagrams for better accessibility feat(presentation): include draw.io file for detailed project structure representation
</commit_message>
<xml_diff>
--- a/Prezentacja UML projektu.pptx
+++ b/Prezentacja UML projektu.pptx
@@ -5,7 +5,7 @@
     <p:sldMasterId id="2147483678" r:id="rId1"/>
   </p:sldMasterIdLst>
   <p:notesMasterIdLst>
-    <p:notesMasterId r:id="rId21"/>
+    <p:notesMasterId r:id="rId22"/>
   </p:notesMasterIdLst>
   <p:sldIdLst>
     <p:sldId id="256" r:id="rId2"/>
@@ -27,29 +27,30 @@
     <p:sldId id="320" r:id="rId18"/>
     <p:sldId id="319" r:id="rId19"/>
     <p:sldId id="321" r:id="rId20"/>
+    <p:sldId id="324" r:id="rId21"/>
   </p:sldIdLst>
   <p:sldSz cx="9144000" cy="5143500" type="screen16x9"/>
   <p:notesSz cx="6858000" cy="9144000"/>
   <p:embeddedFontLst>
     <p:embeddedFont>
       <p:font typeface="Figtree Black" pitchFamily="2" charset="0"/>
-      <p:bold r:id="rId22"/>
-      <p:italic r:id="rId23"/>
-      <p:boldItalic r:id="rId24"/>
+      <p:bold r:id="rId23"/>
+      <p:italic r:id="rId24"/>
+      <p:boldItalic r:id="rId25"/>
     </p:embeddedFont>
     <p:embeddedFont>
       <p:font typeface="Hanken Grotesk" pitchFamily="2" charset="77"/>
-      <p:regular r:id="rId25"/>
-      <p:bold r:id="rId26"/>
-      <p:italic r:id="rId27"/>
-      <p:boldItalic r:id="rId28"/>
+      <p:regular r:id="rId26"/>
+      <p:bold r:id="rId27"/>
+      <p:italic r:id="rId28"/>
+      <p:boldItalic r:id="rId29"/>
     </p:embeddedFont>
     <p:embeddedFont>
       <p:font typeface="Lato" panose="020F0502020204030203" pitchFamily="34" charset="0"/>
-      <p:regular r:id="rId29"/>
-      <p:bold r:id="rId30"/>
-      <p:italic r:id="rId31"/>
-      <p:boldItalic r:id="rId32"/>
+      <p:regular r:id="rId30"/>
+      <p:bold r:id="rId31"/>
+      <p:italic r:id="rId32"/>
+      <p:boldItalic r:id="rId33"/>
     </p:embeddedFont>
   </p:embeddedFontLst>
   <p:defaultTextStyle>
@@ -2233,6 +2234,133 @@
     <p:extLst>
       <p:ext uri="{BB962C8B-B14F-4D97-AF65-F5344CB8AC3E}">
         <p14:creationId xmlns:p14="http://schemas.microsoft.com/office/powerpoint/2010/main" val="3060885530"/>
+      </p:ext>
+    </p:extLst>
+  </p:cSld>
+  <p:clrMapOvr>
+    <a:masterClrMapping/>
+  </p:clrMapOvr>
+</p:notes>
+</file>
+
+<file path=ppt/notesSlides/notesSlide20.xml><?xml version="1.0" encoding="utf-8"?>
+<p:notes xmlns:a="http://schemas.openxmlformats.org/drawingml/2006/main" xmlns:r="http://schemas.openxmlformats.org/officeDocument/2006/relationships" xmlns:p="http://schemas.openxmlformats.org/presentationml/2006/main" showMasterSp="0" showMasterPhAnim="0">
+  <p:cSld>
+    <p:spTree>
+      <p:nvGrpSpPr>
+        <p:cNvPr id="1" name="Shape 410">
+          <a:extLst>
+            <a:ext uri="{FF2B5EF4-FFF2-40B4-BE49-F238E27FC236}">
+              <a16:creationId xmlns:a16="http://schemas.microsoft.com/office/drawing/2014/main" id="{AF2039AF-DEAB-3DFF-249F-BBC62A3539A7}"/>
+            </a:ext>
+          </a:extLst>
+        </p:cNvPr>
+        <p:cNvGrpSpPr/>
+        <p:nvPr/>
+      </p:nvGrpSpPr>
+      <p:grpSpPr>
+        <a:xfrm>
+          <a:off x="0" y="0"/>
+          <a:ext cx="0" cy="0"/>
+          <a:chOff x="0" y="0"/>
+          <a:chExt cx="0" cy="0"/>
+        </a:xfrm>
+      </p:grpSpPr>
+      <p:sp>
+        <p:nvSpPr>
+          <p:cNvPr id="411" name="Google Shape;411;g2161ca7da69_2_0:notes">
+            <a:extLst>
+              <a:ext uri="{FF2B5EF4-FFF2-40B4-BE49-F238E27FC236}">
+                <a16:creationId xmlns:a16="http://schemas.microsoft.com/office/drawing/2014/main" id="{64090B3C-3C60-69CF-D092-B66C05540C11}"/>
+              </a:ext>
+            </a:extLst>
+          </p:cNvPr>
+          <p:cNvSpPr>
+            <a:spLocks noGrp="1" noRot="1" noChangeAspect="1"/>
+          </p:cNvSpPr>
+          <p:nvPr>
+            <p:ph type="sldImg" idx="2"/>
+          </p:nvPr>
+        </p:nvSpPr>
+        <p:spPr>
+          <a:xfrm>
+            <a:off x="381000" y="685800"/>
+            <a:ext cx="6096000" cy="3429000"/>
+          </a:xfrm>
+          <a:custGeom>
+            <a:avLst/>
+            <a:gdLst/>
+            <a:ahLst/>
+            <a:cxnLst/>
+            <a:rect l="l" t="t" r="r" b="b"/>
+            <a:pathLst>
+              <a:path w="120000" h="120000" extrusionOk="0">
+                <a:moveTo>
+                  <a:pt x="0" y="0"/>
+                </a:moveTo>
+                <a:lnTo>
+                  <a:pt x="120000" y="0"/>
+                </a:lnTo>
+                <a:lnTo>
+                  <a:pt x="120000" y="120000"/>
+                </a:lnTo>
+                <a:lnTo>
+                  <a:pt x="0" y="120000"/>
+                </a:lnTo>
+                <a:close/>
+              </a:path>
+            </a:pathLst>
+          </a:custGeom>
+        </p:spPr>
+      </p:sp>
+      <p:sp>
+        <p:nvSpPr>
+          <p:cNvPr id="412" name="Google Shape;412;g2161ca7da69_2_0:notes">
+            <a:extLst>
+              <a:ext uri="{FF2B5EF4-FFF2-40B4-BE49-F238E27FC236}">
+                <a16:creationId xmlns:a16="http://schemas.microsoft.com/office/drawing/2014/main" id="{4796ED21-6620-A881-49B3-800CF3A6530F}"/>
+              </a:ext>
+            </a:extLst>
+          </p:cNvPr>
+          <p:cNvSpPr txBox="1">
+            <a:spLocks noGrp="1"/>
+          </p:cNvSpPr>
+          <p:nvPr>
+            <p:ph type="body" idx="1"/>
+          </p:nvPr>
+        </p:nvSpPr>
+        <p:spPr>
+          <a:xfrm>
+            <a:off x="685800" y="4343400"/>
+            <a:ext cx="5486400" cy="4114800"/>
+          </a:xfrm>
+          <a:prstGeom prst="rect">
+            <a:avLst/>
+          </a:prstGeom>
+        </p:spPr>
+        <p:txBody>
+          <a:bodyPr spcFirstLastPara="1" wrap="square" lIns="91425" tIns="91425" rIns="91425" bIns="91425" anchor="t" anchorCtr="0">
+            <a:noAutofit/>
+          </a:bodyPr>
+          <a:lstStyle/>
+          <a:p>
+            <a:pPr marL="0" lvl="0" indent="0" algn="l" rtl="0">
+              <a:spcBef>
+                <a:spcPts val="0"/>
+              </a:spcBef>
+              <a:spcAft>
+                <a:spcPts val="0"/>
+              </a:spcAft>
+              <a:buNone/>
+            </a:pPr>
+            <a:endParaRPr/>
+          </a:p>
+        </p:txBody>
+      </p:sp>
+    </p:spTree>
+    <p:extLst>
+      <p:ext uri="{BB962C8B-B14F-4D97-AF65-F5344CB8AC3E}">
+        <p14:creationId xmlns:p14="http://schemas.microsoft.com/office/powerpoint/2010/main" val="2548069201"/>
       </p:ext>
     </p:extLst>
   </p:cSld>
@@ -8779,6 +8907,36 @@
           <a:chExt cx="0" cy="0"/>
         </a:xfrm>
       </p:grpSpPr>
+      <p:pic>
+        <p:nvPicPr>
+          <p:cNvPr id="3" name="Picture 2" descr="A screenshot of a computer&#10;&#10;Description automatically generated">
+            <a:extLst>
+              <a:ext uri="{FF2B5EF4-FFF2-40B4-BE49-F238E27FC236}">
+                <a16:creationId xmlns:a16="http://schemas.microsoft.com/office/drawing/2014/main" id="{ADDBFF01-7D72-7ABE-845E-F5CF5E296D77}"/>
+              </a:ext>
+            </a:extLst>
+          </p:cNvPr>
+          <p:cNvPicPr>
+            <a:picLocks noChangeAspect="1"/>
+          </p:cNvPicPr>
+          <p:nvPr/>
+        </p:nvPicPr>
+        <p:blipFill>
+          <a:blip r:embed="rId3"/>
+          <a:stretch>
+            <a:fillRect/>
+          </a:stretch>
+        </p:blipFill>
+        <p:spPr>
+          <a:xfrm>
+            <a:off x="1168907" y="386756"/>
+            <a:ext cx="6806186" cy="4369987"/>
+          </a:xfrm>
+          <a:prstGeom prst="rect">
+            <a:avLst/>
+          </a:prstGeom>
+        </p:spPr>
+      </p:pic>
     </p:spTree>
     <p:extLst>
       <p:ext uri="{BB962C8B-B14F-4D97-AF65-F5344CB8AC3E}">
@@ -9579,6 +9737,36 @@
           <a:chExt cx="0" cy="0"/>
         </a:xfrm>
       </p:grpSpPr>
+      <p:pic>
+        <p:nvPicPr>
+          <p:cNvPr id="3" name="Picture 2" descr="A screenshot of a computer program&#10;&#10;Description automatically generated">
+            <a:extLst>
+              <a:ext uri="{FF2B5EF4-FFF2-40B4-BE49-F238E27FC236}">
+                <a16:creationId xmlns:a16="http://schemas.microsoft.com/office/drawing/2014/main" id="{91EC3932-613E-72A1-8FC3-CFF2777030EC}"/>
+              </a:ext>
+            </a:extLst>
+          </p:cNvPr>
+          <p:cNvPicPr>
+            <a:picLocks noChangeAspect="1"/>
+          </p:cNvPicPr>
+          <p:nvPr/>
+        </p:nvPicPr>
+        <p:blipFill>
+          <a:blip r:embed="rId3"/>
+          <a:stretch>
+            <a:fillRect/>
+          </a:stretch>
+        </p:blipFill>
+        <p:spPr>
+          <a:xfrm>
+            <a:off x="308719" y="935225"/>
+            <a:ext cx="8526561" cy="3273050"/>
+          </a:xfrm>
+          <a:prstGeom prst="rect">
+            <a:avLst/>
+          </a:prstGeom>
+        </p:spPr>
+      </p:pic>
     </p:spTree>
     <p:extLst>
       <p:ext uri="{BB962C8B-B14F-4D97-AF65-F5344CB8AC3E}">
@@ -10461,6 +10649,36 @@
           <a:chExt cx="0" cy="0"/>
         </a:xfrm>
       </p:grpSpPr>
+      <p:pic>
+        <p:nvPicPr>
+          <p:cNvPr id="3" name="Picture 2" descr="A diagram of a company&#10;&#10;Description automatically generated with medium confidence">
+            <a:extLst>
+              <a:ext uri="{FF2B5EF4-FFF2-40B4-BE49-F238E27FC236}">
+                <a16:creationId xmlns:a16="http://schemas.microsoft.com/office/drawing/2014/main" id="{46FCE021-7067-ECBB-E899-897B4D47BE2E}"/>
+              </a:ext>
+            </a:extLst>
+          </p:cNvPr>
+          <p:cNvPicPr>
+            <a:picLocks noChangeAspect="1"/>
+          </p:cNvPicPr>
+          <p:nvPr/>
+        </p:nvPicPr>
+        <p:blipFill>
+          <a:blip r:embed="rId3"/>
+          <a:stretch>
+            <a:fillRect/>
+          </a:stretch>
+        </p:blipFill>
+        <p:spPr>
+          <a:xfrm>
+            <a:off x="247135" y="255126"/>
+            <a:ext cx="8623356" cy="4012074"/>
+          </a:xfrm>
+          <a:prstGeom prst="rect">
+            <a:avLst/>
+          </a:prstGeom>
+        </p:spPr>
+      </p:pic>
     </p:spTree>
     <p:extLst>
       <p:ext uri="{BB962C8B-B14F-4D97-AF65-F5344CB8AC3E}">
@@ -11335,6 +11553,36 @@
           <a:chExt cx="0" cy="0"/>
         </a:xfrm>
       </p:grpSpPr>
+      <p:pic>
+        <p:nvPicPr>
+          <p:cNvPr id="5" name="Picture 4" descr="A diagram of a function&#10;&#10;Description automatically generated with medium confidence">
+            <a:extLst>
+              <a:ext uri="{FF2B5EF4-FFF2-40B4-BE49-F238E27FC236}">
+                <a16:creationId xmlns:a16="http://schemas.microsoft.com/office/drawing/2014/main" id="{D283154C-1C4F-7B8E-C2ED-258946DD29F1}"/>
+              </a:ext>
+            </a:extLst>
+          </p:cNvPr>
+          <p:cNvPicPr>
+            <a:picLocks noChangeAspect="1"/>
+          </p:cNvPicPr>
+          <p:nvPr/>
+        </p:nvPicPr>
+        <p:blipFill>
+          <a:blip r:embed="rId3"/>
+          <a:stretch>
+            <a:fillRect/>
+          </a:stretch>
+        </p:blipFill>
+        <p:spPr>
+          <a:xfrm>
+            <a:off x="685800" y="1021029"/>
+            <a:ext cx="7772400" cy="3101441"/>
+          </a:xfrm>
+          <a:prstGeom prst="rect">
+            <a:avLst/>
+          </a:prstGeom>
+        </p:spPr>
+      </p:pic>
     </p:spTree>
     <p:extLst>
       <p:ext uri="{BB962C8B-B14F-4D97-AF65-F5344CB8AC3E}">
@@ -12195,6 +12443,36 @@
           <a:chExt cx="0" cy="0"/>
         </a:xfrm>
       </p:grpSpPr>
+      <p:pic>
+        <p:nvPicPr>
+          <p:cNvPr id="3" name="Picture 2" descr="A screenshot of a computer program&#10;&#10;Description automatically generated">
+            <a:extLst>
+              <a:ext uri="{FF2B5EF4-FFF2-40B4-BE49-F238E27FC236}">
+                <a16:creationId xmlns:a16="http://schemas.microsoft.com/office/drawing/2014/main" id="{3EDB6652-0041-CA7C-093F-0AF8E90DC40C}"/>
+              </a:ext>
+            </a:extLst>
+          </p:cNvPr>
+          <p:cNvPicPr>
+            <a:picLocks noChangeAspect="1"/>
+          </p:cNvPicPr>
+          <p:nvPr/>
+        </p:nvPicPr>
+        <p:blipFill>
+          <a:blip r:embed="rId3"/>
+          <a:stretch>
+            <a:fillRect/>
+          </a:stretch>
+        </p:blipFill>
+        <p:spPr>
+          <a:xfrm>
+            <a:off x="1995098" y="377479"/>
+            <a:ext cx="5153804" cy="4388542"/>
+          </a:xfrm>
+          <a:prstGeom prst="rect">
+            <a:avLst/>
+          </a:prstGeom>
+        </p:spPr>
+      </p:pic>
     </p:spTree>
     <p:extLst>
       <p:ext uri="{BB962C8B-B14F-4D97-AF65-F5344CB8AC3E}">
@@ -13405,6 +13683,98 @@
 </p:sld>
 </file>
 
+<file path=ppt/slides/slide20.xml><?xml version="1.0" encoding="utf-8"?>
+<p:sld xmlns:a="http://schemas.openxmlformats.org/drawingml/2006/main" xmlns:r="http://schemas.openxmlformats.org/officeDocument/2006/relationships" xmlns:p="http://schemas.openxmlformats.org/presentationml/2006/main">
+  <p:cSld>
+    <p:spTree>
+      <p:nvGrpSpPr>
+        <p:cNvPr id="1" name="Shape 413">
+          <a:extLst>
+            <a:ext uri="{FF2B5EF4-FFF2-40B4-BE49-F238E27FC236}">
+              <a16:creationId xmlns:a16="http://schemas.microsoft.com/office/drawing/2014/main" id="{C43A1A52-94B1-C034-B357-DA166B264709}"/>
+            </a:ext>
+          </a:extLst>
+        </p:cNvPr>
+        <p:cNvGrpSpPr/>
+        <p:nvPr/>
+      </p:nvGrpSpPr>
+      <p:grpSpPr>
+        <a:xfrm>
+          <a:off x="0" y="0"/>
+          <a:ext cx="0" cy="0"/>
+          <a:chOff x="0" y="0"/>
+          <a:chExt cx="0" cy="0"/>
+        </a:xfrm>
+      </p:grpSpPr>
+      <p:sp>
+        <p:nvSpPr>
+          <p:cNvPr id="414" name="Google Shape;414;p43">
+            <a:extLst>
+              <a:ext uri="{FF2B5EF4-FFF2-40B4-BE49-F238E27FC236}">
+                <a16:creationId xmlns:a16="http://schemas.microsoft.com/office/drawing/2014/main" id="{03304025-0F32-C12D-3EA1-7F88D4DA9FB0}"/>
+              </a:ext>
+            </a:extLst>
+          </p:cNvPr>
+          <p:cNvSpPr txBox="1">
+            <a:spLocks noGrp="1"/>
+          </p:cNvSpPr>
+          <p:nvPr>
+            <p:ph type="title"/>
+          </p:nvPr>
+        </p:nvSpPr>
+        <p:spPr>
+          <a:xfrm>
+            <a:off x="1644450" y="1126941"/>
+            <a:ext cx="5855100" cy="1340903"/>
+          </a:xfrm>
+          <a:prstGeom prst="rect">
+            <a:avLst/>
+          </a:prstGeom>
+        </p:spPr>
+        <p:txBody>
+          <a:bodyPr spcFirstLastPara="1" wrap="square" lIns="91425" tIns="91425" rIns="91425" bIns="91425" anchor="b" anchorCtr="0">
+            <a:noAutofit/>
+          </a:bodyPr>
+          <a:lstStyle/>
+          <a:p>
+            <a:pPr marL="0" lvl="0" indent="0" algn="ctr" rtl="0">
+              <a:spcBef>
+                <a:spcPts val="0"/>
+              </a:spcBef>
+              <a:spcAft>
+                <a:spcPts val="0"/>
+              </a:spcAft>
+              <a:buNone/>
+            </a:pPr>
+            <a:r>
+              <a:rPr lang="en" dirty="0" err="1"/>
+              <a:t>Schemat</a:t>
+            </a:r>
+            <a:r>
+              <a:rPr lang="en" dirty="0"/>
+              <a:t> UML </a:t>
+            </a:r>
+            <a:r>
+              <a:rPr lang="en" dirty="0" err="1"/>
+              <a:t>Projektu</a:t>
+            </a:r>
+            <a:endParaRPr dirty="0"/>
+          </a:p>
+        </p:txBody>
+      </p:sp>
+    </p:spTree>
+    <p:extLst>
+      <p:ext uri="{BB962C8B-B14F-4D97-AF65-F5344CB8AC3E}">
+        <p14:creationId xmlns:p14="http://schemas.microsoft.com/office/powerpoint/2010/main" val="2844590691"/>
+      </p:ext>
+    </p:extLst>
+  </p:cSld>
+  <p:clrMapOvr>
+    <a:masterClrMapping/>
+  </p:clrMapOvr>
+</p:sld>
+</file>
+
 <file path=ppt/slides/slide3.xml><?xml version="1.0" encoding="utf-8"?>
 <p:sld xmlns:a="http://schemas.openxmlformats.org/drawingml/2006/main" xmlns:r="http://schemas.openxmlformats.org/officeDocument/2006/relationships" xmlns:p="http://schemas.openxmlformats.org/presentationml/2006/main">
   <p:cSld>
@@ -14430,7 +14800,7 @@
           </a:bodyPr>
           <a:lstStyle/>
           <a:p>
-            <a:pPr marL="0" lvl="0" indent="0" algn="l" rtl="0">
+            <a:pPr marL="0" lvl="0" indent="0" algn="ctr" rtl="0">
               <a:spcBef>
                 <a:spcPts val="0"/>
               </a:spcBef>
@@ -14447,6 +14817,36 @@
           </a:p>
         </p:txBody>
       </p:sp>
+      <p:pic>
+        <p:nvPicPr>
+          <p:cNvPr id="5" name="Picture 4" descr="A group of words on a white background&#10;&#10;Description automatically generated">
+            <a:extLst>
+              <a:ext uri="{FF2B5EF4-FFF2-40B4-BE49-F238E27FC236}">
+                <a16:creationId xmlns:a16="http://schemas.microsoft.com/office/drawing/2014/main" id="{B08EBF21-2624-0D0E-D5E5-8726CF6C6931}"/>
+              </a:ext>
+            </a:extLst>
+          </p:cNvPr>
+          <p:cNvPicPr>
+            <a:picLocks noChangeAspect="1"/>
+          </p:cNvPicPr>
+          <p:nvPr/>
+        </p:nvPicPr>
+        <p:blipFill>
+          <a:blip r:embed="rId3"/>
+          <a:stretch>
+            <a:fillRect/>
+          </a:stretch>
+        </p:blipFill>
+        <p:spPr>
+          <a:xfrm>
+            <a:off x="1609018" y="1089808"/>
+            <a:ext cx="5925963" cy="3542764"/>
+          </a:xfrm>
+          <a:prstGeom prst="rect">
+            <a:avLst/>
+          </a:prstGeom>
+        </p:spPr>
+      </p:pic>
     </p:spTree>
     <p:extLst>
       <p:ext uri="{BB962C8B-B14F-4D97-AF65-F5344CB8AC3E}">

</xml_diff>

<commit_message>
chore: add combined UML presentation and update existing UML files to reflect recent changes
</commit_message>
<xml_diff>
--- a/Prezentacja UML projektu.pptx
+++ b/Prezentacja UML projektu.pptx
@@ -5,52 +5,53 @@
     <p:sldMasterId id="2147483678" r:id="rId1"/>
   </p:sldMasterIdLst>
   <p:notesMasterIdLst>
-    <p:notesMasterId r:id="rId22"/>
+    <p:notesMasterId r:id="rId23"/>
   </p:notesMasterIdLst>
   <p:sldIdLst>
     <p:sldId id="256" r:id="rId2"/>
-    <p:sldId id="305" r:id="rId3"/>
-    <p:sldId id="307" r:id="rId4"/>
-    <p:sldId id="306" r:id="rId5"/>
-    <p:sldId id="308" r:id="rId6"/>
-    <p:sldId id="309" r:id="rId7"/>
-    <p:sldId id="310" r:id="rId8"/>
-    <p:sldId id="311" r:id="rId9"/>
-    <p:sldId id="313" r:id="rId10"/>
-    <p:sldId id="315" r:id="rId11"/>
-    <p:sldId id="316" r:id="rId12"/>
-    <p:sldId id="314" r:id="rId13"/>
-    <p:sldId id="317" r:id="rId14"/>
-    <p:sldId id="322" r:id="rId15"/>
-    <p:sldId id="323" r:id="rId16"/>
-    <p:sldId id="318" r:id="rId17"/>
-    <p:sldId id="320" r:id="rId18"/>
-    <p:sldId id="319" r:id="rId19"/>
-    <p:sldId id="321" r:id="rId20"/>
-    <p:sldId id="324" r:id="rId21"/>
+    <p:sldId id="325" r:id="rId3"/>
+    <p:sldId id="305" r:id="rId4"/>
+    <p:sldId id="307" r:id="rId5"/>
+    <p:sldId id="306" r:id="rId6"/>
+    <p:sldId id="308" r:id="rId7"/>
+    <p:sldId id="309" r:id="rId8"/>
+    <p:sldId id="310" r:id="rId9"/>
+    <p:sldId id="311" r:id="rId10"/>
+    <p:sldId id="313" r:id="rId11"/>
+    <p:sldId id="315" r:id="rId12"/>
+    <p:sldId id="316" r:id="rId13"/>
+    <p:sldId id="314" r:id="rId14"/>
+    <p:sldId id="317" r:id="rId15"/>
+    <p:sldId id="322" r:id="rId16"/>
+    <p:sldId id="323" r:id="rId17"/>
+    <p:sldId id="318" r:id="rId18"/>
+    <p:sldId id="320" r:id="rId19"/>
+    <p:sldId id="319" r:id="rId20"/>
+    <p:sldId id="321" r:id="rId21"/>
+    <p:sldId id="324" r:id="rId22"/>
   </p:sldIdLst>
   <p:sldSz cx="9144000" cy="5143500" type="screen16x9"/>
   <p:notesSz cx="6858000" cy="9144000"/>
   <p:embeddedFontLst>
     <p:embeddedFont>
       <p:font typeface="Figtree Black" pitchFamily="2" charset="0"/>
-      <p:bold r:id="rId23"/>
-      <p:italic r:id="rId24"/>
-      <p:boldItalic r:id="rId25"/>
+      <p:bold r:id="rId24"/>
+      <p:italic r:id="rId25"/>
+      <p:boldItalic r:id="rId26"/>
     </p:embeddedFont>
     <p:embeddedFont>
       <p:font typeface="Hanken Grotesk" pitchFamily="2" charset="77"/>
-      <p:regular r:id="rId26"/>
-      <p:bold r:id="rId27"/>
-      <p:italic r:id="rId28"/>
-      <p:boldItalic r:id="rId29"/>
+      <p:regular r:id="rId27"/>
+      <p:bold r:id="rId28"/>
+      <p:italic r:id="rId29"/>
+      <p:boldItalic r:id="rId30"/>
     </p:embeddedFont>
     <p:embeddedFont>
       <p:font typeface="Lato" panose="020F0502020204030203" pitchFamily="34" charset="0"/>
-      <p:regular r:id="rId30"/>
-      <p:bold r:id="rId31"/>
-      <p:italic r:id="rId32"/>
-      <p:boldItalic r:id="rId33"/>
+      <p:regular r:id="rId31"/>
+      <p:bold r:id="rId32"/>
+      <p:italic r:id="rId33"/>
+      <p:boldItalic r:id="rId34"/>
     </p:embeddedFont>
   </p:embeddedFontLst>
   <p:defaultTextStyle>
@@ -851,6 +852,133 @@
   <p:cSld>
     <p:spTree>
       <p:nvGrpSpPr>
+        <p:cNvPr id="1" name="Shape 591">
+          <a:extLst>
+            <a:ext uri="{FF2B5EF4-FFF2-40B4-BE49-F238E27FC236}">
+              <a16:creationId xmlns:a16="http://schemas.microsoft.com/office/drawing/2014/main" id="{5C18A525-91DF-C815-8836-D80482781AFE}"/>
+            </a:ext>
+          </a:extLst>
+        </p:cNvPr>
+        <p:cNvGrpSpPr/>
+        <p:nvPr/>
+      </p:nvGrpSpPr>
+      <p:grpSpPr>
+        <a:xfrm>
+          <a:off x="0" y="0"/>
+          <a:ext cx="0" cy="0"/>
+          <a:chOff x="0" y="0"/>
+          <a:chExt cx="0" cy="0"/>
+        </a:xfrm>
+      </p:grpSpPr>
+      <p:sp>
+        <p:nvSpPr>
+          <p:cNvPr id="592" name="Google Shape;592;g54dda1946d_6_332:notes">
+            <a:extLst>
+              <a:ext uri="{FF2B5EF4-FFF2-40B4-BE49-F238E27FC236}">
+                <a16:creationId xmlns:a16="http://schemas.microsoft.com/office/drawing/2014/main" id="{17B0FA60-E911-FE24-38A3-62FF7B29122C}"/>
+              </a:ext>
+            </a:extLst>
+          </p:cNvPr>
+          <p:cNvSpPr>
+            <a:spLocks noGrp="1" noRot="1" noChangeAspect="1"/>
+          </p:cNvSpPr>
+          <p:nvPr>
+            <p:ph type="sldImg" idx="2"/>
+          </p:nvPr>
+        </p:nvSpPr>
+        <p:spPr>
+          <a:xfrm>
+            <a:off x="381000" y="685800"/>
+            <a:ext cx="6096000" cy="3429000"/>
+          </a:xfrm>
+          <a:custGeom>
+            <a:avLst/>
+            <a:gdLst/>
+            <a:ahLst/>
+            <a:cxnLst/>
+            <a:rect l="l" t="t" r="r" b="b"/>
+            <a:pathLst>
+              <a:path w="120000" h="120000" extrusionOk="0">
+                <a:moveTo>
+                  <a:pt x="0" y="0"/>
+                </a:moveTo>
+                <a:lnTo>
+                  <a:pt x="120000" y="0"/>
+                </a:lnTo>
+                <a:lnTo>
+                  <a:pt x="120000" y="120000"/>
+                </a:lnTo>
+                <a:lnTo>
+                  <a:pt x="0" y="120000"/>
+                </a:lnTo>
+                <a:close/>
+              </a:path>
+            </a:pathLst>
+          </a:custGeom>
+        </p:spPr>
+      </p:sp>
+      <p:sp>
+        <p:nvSpPr>
+          <p:cNvPr id="593" name="Google Shape;593;g54dda1946d_6_332:notes">
+            <a:extLst>
+              <a:ext uri="{FF2B5EF4-FFF2-40B4-BE49-F238E27FC236}">
+                <a16:creationId xmlns:a16="http://schemas.microsoft.com/office/drawing/2014/main" id="{24E62F68-D0AA-E7B3-D81D-FBFD86639227}"/>
+              </a:ext>
+            </a:extLst>
+          </p:cNvPr>
+          <p:cNvSpPr txBox="1">
+            <a:spLocks noGrp="1"/>
+          </p:cNvSpPr>
+          <p:nvPr>
+            <p:ph type="body" idx="1"/>
+          </p:nvPr>
+        </p:nvSpPr>
+        <p:spPr>
+          <a:xfrm>
+            <a:off x="685800" y="4343400"/>
+            <a:ext cx="5486400" cy="4114800"/>
+          </a:xfrm>
+          <a:prstGeom prst="rect">
+            <a:avLst/>
+          </a:prstGeom>
+        </p:spPr>
+        <p:txBody>
+          <a:bodyPr spcFirstLastPara="1" wrap="square" lIns="91425" tIns="91425" rIns="91425" bIns="91425" anchor="t" anchorCtr="0">
+            <a:noAutofit/>
+          </a:bodyPr>
+          <a:lstStyle/>
+          <a:p>
+            <a:pPr marL="0" lvl="0" indent="0" algn="l" rtl="0">
+              <a:spcBef>
+                <a:spcPts val="0"/>
+              </a:spcBef>
+              <a:spcAft>
+                <a:spcPts val="0"/>
+              </a:spcAft>
+              <a:buNone/>
+            </a:pPr>
+            <a:endParaRPr/>
+          </a:p>
+        </p:txBody>
+      </p:sp>
+    </p:spTree>
+    <p:extLst>
+      <p:ext uri="{BB962C8B-B14F-4D97-AF65-F5344CB8AC3E}">
+        <p14:creationId xmlns:p14="http://schemas.microsoft.com/office/powerpoint/2010/main" val="3625610259"/>
+      </p:ext>
+    </p:extLst>
+  </p:cSld>
+  <p:clrMapOvr>
+    <a:masterClrMapping/>
+  </p:clrMapOvr>
+</p:notes>
+</file>
+
+<file path=ppt/notesSlides/notesSlide11.xml><?xml version="1.0" encoding="utf-8"?>
+<p:notes xmlns:a="http://schemas.openxmlformats.org/drawingml/2006/main" xmlns:r="http://schemas.openxmlformats.org/officeDocument/2006/relationships" xmlns:p="http://schemas.openxmlformats.org/presentationml/2006/main" showMasterSp="0" showMasterPhAnim="0">
+  <p:cSld>
+    <p:spTree>
+      <p:nvGrpSpPr>
         <p:cNvPr id="1" name="Shape 325">
           <a:extLst>
             <a:ext uri="{FF2B5EF4-FFF2-40B4-BE49-F238E27FC236}">
@@ -973,7 +1101,7 @@
 </p:notes>
 </file>
 
-<file path=ppt/notesSlides/notesSlide11.xml><?xml version="1.0" encoding="utf-8"?>
+<file path=ppt/notesSlides/notesSlide12.xml><?xml version="1.0" encoding="utf-8"?>
 <p:notes xmlns:a="http://schemas.openxmlformats.org/drawingml/2006/main" xmlns:r="http://schemas.openxmlformats.org/officeDocument/2006/relationships" xmlns:p="http://schemas.openxmlformats.org/presentationml/2006/main" showMasterSp="0" showMasterPhAnim="0">
   <p:cSld>
     <p:spTree>
@@ -1100,7 +1228,7 @@
 </p:notes>
 </file>
 
-<file path=ppt/notesSlides/notesSlide12.xml><?xml version="1.0" encoding="utf-8"?>
+<file path=ppt/notesSlides/notesSlide13.xml><?xml version="1.0" encoding="utf-8"?>
 <p:notes xmlns:a="http://schemas.openxmlformats.org/drawingml/2006/main" xmlns:r="http://schemas.openxmlformats.org/officeDocument/2006/relationships" xmlns:p="http://schemas.openxmlformats.org/presentationml/2006/main" showMasterSp="0" showMasterPhAnim="0">
   <p:cSld>
     <p:spTree>
@@ -1227,7 +1355,7 @@
 </p:notes>
 </file>
 
-<file path=ppt/notesSlides/notesSlide13.xml><?xml version="1.0" encoding="utf-8"?>
+<file path=ppt/notesSlides/notesSlide14.xml><?xml version="1.0" encoding="utf-8"?>
 <p:notes xmlns:a="http://schemas.openxmlformats.org/drawingml/2006/main" xmlns:r="http://schemas.openxmlformats.org/officeDocument/2006/relationships" xmlns:p="http://schemas.openxmlformats.org/presentationml/2006/main" showMasterSp="0" showMasterPhAnim="0">
   <p:cSld>
     <p:spTree>
@@ -1354,7 +1482,7 @@
 </p:notes>
 </file>
 
-<file path=ppt/notesSlides/notesSlide14.xml><?xml version="1.0" encoding="utf-8"?>
+<file path=ppt/notesSlides/notesSlide15.xml><?xml version="1.0" encoding="utf-8"?>
 <p:notes xmlns:a="http://schemas.openxmlformats.org/drawingml/2006/main" xmlns:r="http://schemas.openxmlformats.org/officeDocument/2006/relationships" xmlns:p="http://schemas.openxmlformats.org/presentationml/2006/main" showMasterSp="0" showMasterPhAnim="0">
   <p:cSld>
     <p:spTree>
@@ -1481,7 +1609,7 @@
 </p:notes>
 </file>
 
-<file path=ppt/notesSlides/notesSlide15.xml><?xml version="1.0" encoding="utf-8"?>
+<file path=ppt/notesSlides/notesSlide16.xml><?xml version="1.0" encoding="utf-8"?>
 <p:notes xmlns:a="http://schemas.openxmlformats.org/drawingml/2006/main" xmlns:r="http://schemas.openxmlformats.org/officeDocument/2006/relationships" xmlns:p="http://schemas.openxmlformats.org/presentationml/2006/main" showMasterSp="0" showMasterPhAnim="0">
   <p:cSld>
     <p:spTree>
@@ -1608,7 +1736,7 @@
 </p:notes>
 </file>
 
-<file path=ppt/notesSlides/notesSlide16.xml><?xml version="1.0" encoding="utf-8"?>
+<file path=ppt/notesSlides/notesSlide17.xml><?xml version="1.0" encoding="utf-8"?>
 <p:notes xmlns:a="http://schemas.openxmlformats.org/drawingml/2006/main" xmlns:r="http://schemas.openxmlformats.org/officeDocument/2006/relationships" xmlns:p="http://schemas.openxmlformats.org/presentationml/2006/main" showMasterSp="0" showMasterPhAnim="0">
   <p:cSld>
     <p:spTree>
@@ -1735,7 +1863,7 @@
 </p:notes>
 </file>
 
-<file path=ppt/notesSlides/notesSlide17.xml><?xml version="1.0" encoding="utf-8"?>
+<file path=ppt/notesSlides/notesSlide18.xml><?xml version="1.0" encoding="utf-8"?>
 <p:notes xmlns:a="http://schemas.openxmlformats.org/drawingml/2006/main" xmlns:r="http://schemas.openxmlformats.org/officeDocument/2006/relationships" xmlns:p="http://schemas.openxmlformats.org/presentationml/2006/main" showMasterSp="0" showMasterPhAnim="0">
   <p:cSld>
     <p:spTree>
@@ -1862,7 +1990,7 @@
 </p:notes>
 </file>
 
-<file path=ppt/notesSlides/notesSlide18.xml><?xml version="1.0" encoding="utf-8"?>
+<file path=ppt/notesSlides/notesSlide19.xml><?xml version="1.0" encoding="utf-8"?>
 <p:notes xmlns:a="http://schemas.openxmlformats.org/drawingml/2006/main" xmlns:r="http://schemas.openxmlformats.org/officeDocument/2006/relationships" xmlns:p="http://schemas.openxmlformats.org/presentationml/2006/main" showMasterSp="0" showMasterPhAnim="0">
   <p:cSld>
     <p:spTree>
@@ -1989,7 +2117,134 @@
 </p:notes>
 </file>
 
-<file path=ppt/notesSlides/notesSlide19.xml><?xml version="1.0" encoding="utf-8"?>
+<file path=ppt/notesSlides/notesSlide2.xml><?xml version="1.0" encoding="utf-8"?>
+<p:notes xmlns:a="http://schemas.openxmlformats.org/drawingml/2006/main" xmlns:r="http://schemas.openxmlformats.org/officeDocument/2006/relationships" xmlns:p="http://schemas.openxmlformats.org/presentationml/2006/main" showMasterSp="0" showMasterPhAnim="0">
+  <p:cSld>
+    <p:spTree>
+      <p:nvGrpSpPr>
+        <p:cNvPr id="1" name="Shape 615">
+          <a:extLst>
+            <a:ext uri="{FF2B5EF4-FFF2-40B4-BE49-F238E27FC236}">
+              <a16:creationId xmlns:a16="http://schemas.microsoft.com/office/drawing/2014/main" id="{F01D5E79-0B46-7A5B-8EDF-0F3751AF5E94}"/>
+            </a:ext>
+          </a:extLst>
+        </p:cNvPr>
+        <p:cNvGrpSpPr/>
+        <p:nvPr/>
+      </p:nvGrpSpPr>
+      <p:grpSpPr>
+        <a:xfrm>
+          <a:off x="0" y="0"/>
+          <a:ext cx="0" cy="0"/>
+          <a:chOff x="0" y="0"/>
+          <a:chExt cx="0" cy="0"/>
+        </a:xfrm>
+      </p:grpSpPr>
+      <p:sp>
+        <p:nvSpPr>
+          <p:cNvPr id="616" name="Google Shape;616;g54dda1946d_4_2679:notes">
+            <a:extLst>
+              <a:ext uri="{FF2B5EF4-FFF2-40B4-BE49-F238E27FC236}">
+                <a16:creationId xmlns:a16="http://schemas.microsoft.com/office/drawing/2014/main" id="{DE67F0AC-9664-F858-4E9F-81DD77B68640}"/>
+              </a:ext>
+            </a:extLst>
+          </p:cNvPr>
+          <p:cNvSpPr>
+            <a:spLocks noGrp="1" noRot="1" noChangeAspect="1"/>
+          </p:cNvSpPr>
+          <p:nvPr>
+            <p:ph type="sldImg" idx="2"/>
+          </p:nvPr>
+        </p:nvSpPr>
+        <p:spPr>
+          <a:xfrm>
+            <a:off x="381000" y="685800"/>
+            <a:ext cx="6096000" cy="3429000"/>
+          </a:xfrm>
+          <a:custGeom>
+            <a:avLst/>
+            <a:gdLst/>
+            <a:ahLst/>
+            <a:cxnLst/>
+            <a:rect l="l" t="t" r="r" b="b"/>
+            <a:pathLst>
+              <a:path w="120000" h="120000" extrusionOk="0">
+                <a:moveTo>
+                  <a:pt x="0" y="0"/>
+                </a:moveTo>
+                <a:lnTo>
+                  <a:pt x="120000" y="0"/>
+                </a:lnTo>
+                <a:lnTo>
+                  <a:pt x="120000" y="120000"/>
+                </a:lnTo>
+                <a:lnTo>
+                  <a:pt x="0" y="120000"/>
+                </a:lnTo>
+                <a:close/>
+              </a:path>
+            </a:pathLst>
+          </a:custGeom>
+        </p:spPr>
+      </p:sp>
+      <p:sp>
+        <p:nvSpPr>
+          <p:cNvPr id="617" name="Google Shape;617;g54dda1946d_4_2679:notes">
+            <a:extLst>
+              <a:ext uri="{FF2B5EF4-FFF2-40B4-BE49-F238E27FC236}">
+                <a16:creationId xmlns:a16="http://schemas.microsoft.com/office/drawing/2014/main" id="{6A5C1367-BC58-59E0-36AB-D2943A08BFC7}"/>
+              </a:ext>
+            </a:extLst>
+          </p:cNvPr>
+          <p:cNvSpPr txBox="1">
+            <a:spLocks noGrp="1"/>
+          </p:cNvSpPr>
+          <p:nvPr>
+            <p:ph type="body" idx="1"/>
+          </p:nvPr>
+        </p:nvSpPr>
+        <p:spPr>
+          <a:xfrm>
+            <a:off x="685800" y="4343400"/>
+            <a:ext cx="5486400" cy="4114800"/>
+          </a:xfrm>
+          <a:prstGeom prst="rect">
+            <a:avLst/>
+          </a:prstGeom>
+        </p:spPr>
+        <p:txBody>
+          <a:bodyPr spcFirstLastPara="1" wrap="square" lIns="91425" tIns="91425" rIns="91425" bIns="91425" anchor="t" anchorCtr="0">
+            <a:noAutofit/>
+          </a:bodyPr>
+          <a:lstStyle/>
+          <a:p>
+            <a:pPr marL="0" lvl="0" indent="0" algn="l" rtl="0">
+              <a:spcBef>
+                <a:spcPts val="0"/>
+              </a:spcBef>
+              <a:spcAft>
+                <a:spcPts val="0"/>
+              </a:spcAft>
+              <a:buNone/>
+            </a:pPr>
+            <a:endParaRPr/>
+          </a:p>
+        </p:txBody>
+      </p:sp>
+    </p:spTree>
+    <p:extLst>
+      <p:ext uri="{BB962C8B-B14F-4D97-AF65-F5344CB8AC3E}">
+        <p14:creationId xmlns:p14="http://schemas.microsoft.com/office/powerpoint/2010/main" val="1301623434"/>
+      </p:ext>
+    </p:extLst>
+  </p:cSld>
+  <p:clrMapOvr>
+    <a:masterClrMapping/>
+  </p:clrMapOvr>
+</p:notes>
+</file>
+
+<file path=ppt/notesSlides/notesSlide20.xml><?xml version="1.0" encoding="utf-8"?>
 <p:notes xmlns:a="http://schemas.openxmlformats.org/drawingml/2006/main" xmlns:r="http://schemas.openxmlformats.org/officeDocument/2006/relationships" xmlns:p="http://schemas.openxmlformats.org/presentationml/2006/main" showMasterSp="0" showMasterPhAnim="0">
   <p:cSld>
     <p:spTree>
@@ -2116,7 +2371,134 @@
 </p:notes>
 </file>
 
-<file path=ppt/notesSlides/notesSlide2.xml><?xml version="1.0" encoding="utf-8"?>
+<file path=ppt/notesSlides/notesSlide21.xml><?xml version="1.0" encoding="utf-8"?>
+<p:notes xmlns:a="http://schemas.openxmlformats.org/drawingml/2006/main" xmlns:r="http://schemas.openxmlformats.org/officeDocument/2006/relationships" xmlns:p="http://schemas.openxmlformats.org/presentationml/2006/main" showMasterSp="0" showMasterPhAnim="0">
+  <p:cSld>
+    <p:spTree>
+      <p:nvGrpSpPr>
+        <p:cNvPr id="1" name="Shape 410">
+          <a:extLst>
+            <a:ext uri="{FF2B5EF4-FFF2-40B4-BE49-F238E27FC236}">
+              <a16:creationId xmlns:a16="http://schemas.microsoft.com/office/drawing/2014/main" id="{AF2039AF-DEAB-3DFF-249F-BBC62A3539A7}"/>
+            </a:ext>
+          </a:extLst>
+        </p:cNvPr>
+        <p:cNvGrpSpPr/>
+        <p:nvPr/>
+      </p:nvGrpSpPr>
+      <p:grpSpPr>
+        <a:xfrm>
+          <a:off x="0" y="0"/>
+          <a:ext cx="0" cy="0"/>
+          <a:chOff x="0" y="0"/>
+          <a:chExt cx="0" cy="0"/>
+        </a:xfrm>
+      </p:grpSpPr>
+      <p:sp>
+        <p:nvSpPr>
+          <p:cNvPr id="411" name="Google Shape;411;g2161ca7da69_2_0:notes">
+            <a:extLst>
+              <a:ext uri="{FF2B5EF4-FFF2-40B4-BE49-F238E27FC236}">
+                <a16:creationId xmlns:a16="http://schemas.microsoft.com/office/drawing/2014/main" id="{64090B3C-3C60-69CF-D092-B66C05540C11}"/>
+              </a:ext>
+            </a:extLst>
+          </p:cNvPr>
+          <p:cNvSpPr>
+            <a:spLocks noGrp="1" noRot="1" noChangeAspect="1"/>
+          </p:cNvSpPr>
+          <p:nvPr>
+            <p:ph type="sldImg" idx="2"/>
+          </p:nvPr>
+        </p:nvSpPr>
+        <p:spPr>
+          <a:xfrm>
+            <a:off x="381000" y="685800"/>
+            <a:ext cx="6096000" cy="3429000"/>
+          </a:xfrm>
+          <a:custGeom>
+            <a:avLst/>
+            <a:gdLst/>
+            <a:ahLst/>
+            <a:cxnLst/>
+            <a:rect l="l" t="t" r="r" b="b"/>
+            <a:pathLst>
+              <a:path w="120000" h="120000" extrusionOk="0">
+                <a:moveTo>
+                  <a:pt x="0" y="0"/>
+                </a:moveTo>
+                <a:lnTo>
+                  <a:pt x="120000" y="0"/>
+                </a:lnTo>
+                <a:lnTo>
+                  <a:pt x="120000" y="120000"/>
+                </a:lnTo>
+                <a:lnTo>
+                  <a:pt x="0" y="120000"/>
+                </a:lnTo>
+                <a:close/>
+              </a:path>
+            </a:pathLst>
+          </a:custGeom>
+        </p:spPr>
+      </p:sp>
+      <p:sp>
+        <p:nvSpPr>
+          <p:cNvPr id="412" name="Google Shape;412;g2161ca7da69_2_0:notes">
+            <a:extLst>
+              <a:ext uri="{FF2B5EF4-FFF2-40B4-BE49-F238E27FC236}">
+                <a16:creationId xmlns:a16="http://schemas.microsoft.com/office/drawing/2014/main" id="{4796ED21-6620-A881-49B3-800CF3A6530F}"/>
+              </a:ext>
+            </a:extLst>
+          </p:cNvPr>
+          <p:cNvSpPr txBox="1">
+            <a:spLocks noGrp="1"/>
+          </p:cNvSpPr>
+          <p:nvPr>
+            <p:ph type="body" idx="1"/>
+          </p:nvPr>
+        </p:nvSpPr>
+        <p:spPr>
+          <a:xfrm>
+            <a:off x="685800" y="4343400"/>
+            <a:ext cx="5486400" cy="4114800"/>
+          </a:xfrm>
+          <a:prstGeom prst="rect">
+            <a:avLst/>
+          </a:prstGeom>
+        </p:spPr>
+        <p:txBody>
+          <a:bodyPr spcFirstLastPara="1" wrap="square" lIns="91425" tIns="91425" rIns="91425" bIns="91425" anchor="t" anchorCtr="0">
+            <a:noAutofit/>
+          </a:bodyPr>
+          <a:lstStyle/>
+          <a:p>
+            <a:pPr marL="0" lvl="0" indent="0" algn="l" rtl="0">
+              <a:spcBef>
+                <a:spcPts val="0"/>
+              </a:spcBef>
+              <a:spcAft>
+                <a:spcPts val="0"/>
+              </a:spcAft>
+              <a:buNone/>
+            </a:pPr>
+            <a:endParaRPr/>
+          </a:p>
+        </p:txBody>
+      </p:sp>
+    </p:spTree>
+    <p:extLst>
+      <p:ext uri="{BB962C8B-B14F-4D97-AF65-F5344CB8AC3E}">
+        <p14:creationId xmlns:p14="http://schemas.microsoft.com/office/powerpoint/2010/main" val="2548069201"/>
+      </p:ext>
+    </p:extLst>
+  </p:cSld>
+  <p:clrMapOvr>
+    <a:masterClrMapping/>
+  </p:clrMapOvr>
+</p:notes>
+</file>
+
+<file path=ppt/notesSlides/notesSlide3.xml><?xml version="1.0" encoding="utf-8"?>
 <p:notes xmlns:a="http://schemas.openxmlformats.org/drawingml/2006/main" xmlns:r="http://schemas.openxmlformats.org/officeDocument/2006/relationships" xmlns:p="http://schemas.openxmlformats.org/presentationml/2006/main" showMasterSp="0" showMasterPhAnim="0">
   <p:cSld>
     <p:spTree>
@@ -2243,134 +2625,7 @@
 </p:notes>
 </file>
 
-<file path=ppt/notesSlides/notesSlide20.xml><?xml version="1.0" encoding="utf-8"?>
-<p:notes xmlns:a="http://schemas.openxmlformats.org/drawingml/2006/main" xmlns:r="http://schemas.openxmlformats.org/officeDocument/2006/relationships" xmlns:p="http://schemas.openxmlformats.org/presentationml/2006/main" showMasterSp="0" showMasterPhAnim="0">
-  <p:cSld>
-    <p:spTree>
-      <p:nvGrpSpPr>
-        <p:cNvPr id="1" name="Shape 410">
-          <a:extLst>
-            <a:ext uri="{FF2B5EF4-FFF2-40B4-BE49-F238E27FC236}">
-              <a16:creationId xmlns:a16="http://schemas.microsoft.com/office/drawing/2014/main" id="{AF2039AF-DEAB-3DFF-249F-BBC62A3539A7}"/>
-            </a:ext>
-          </a:extLst>
-        </p:cNvPr>
-        <p:cNvGrpSpPr/>
-        <p:nvPr/>
-      </p:nvGrpSpPr>
-      <p:grpSpPr>
-        <a:xfrm>
-          <a:off x="0" y="0"/>
-          <a:ext cx="0" cy="0"/>
-          <a:chOff x="0" y="0"/>
-          <a:chExt cx="0" cy="0"/>
-        </a:xfrm>
-      </p:grpSpPr>
-      <p:sp>
-        <p:nvSpPr>
-          <p:cNvPr id="411" name="Google Shape;411;g2161ca7da69_2_0:notes">
-            <a:extLst>
-              <a:ext uri="{FF2B5EF4-FFF2-40B4-BE49-F238E27FC236}">
-                <a16:creationId xmlns:a16="http://schemas.microsoft.com/office/drawing/2014/main" id="{64090B3C-3C60-69CF-D092-B66C05540C11}"/>
-              </a:ext>
-            </a:extLst>
-          </p:cNvPr>
-          <p:cNvSpPr>
-            <a:spLocks noGrp="1" noRot="1" noChangeAspect="1"/>
-          </p:cNvSpPr>
-          <p:nvPr>
-            <p:ph type="sldImg" idx="2"/>
-          </p:nvPr>
-        </p:nvSpPr>
-        <p:spPr>
-          <a:xfrm>
-            <a:off x="381000" y="685800"/>
-            <a:ext cx="6096000" cy="3429000"/>
-          </a:xfrm>
-          <a:custGeom>
-            <a:avLst/>
-            <a:gdLst/>
-            <a:ahLst/>
-            <a:cxnLst/>
-            <a:rect l="l" t="t" r="r" b="b"/>
-            <a:pathLst>
-              <a:path w="120000" h="120000" extrusionOk="0">
-                <a:moveTo>
-                  <a:pt x="0" y="0"/>
-                </a:moveTo>
-                <a:lnTo>
-                  <a:pt x="120000" y="0"/>
-                </a:lnTo>
-                <a:lnTo>
-                  <a:pt x="120000" y="120000"/>
-                </a:lnTo>
-                <a:lnTo>
-                  <a:pt x="0" y="120000"/>
-                </a:lnTo>
-                <a:close/>
-              </a:path>
-            </a:pathLst>
-          </a:custGeom>
-        </p:spPr>
-      </p:sp>
-      <p:sp>
-        <p:nvSpPr>
-          <p:cNvPr id="412" name="Google Shape;412;g2161ca7da69_2_0:notes">
-            <a:extLst>
-              <a:ext uri="{FF2B5EF4-FFF2-40B4-BE49-F238E27FC236}">
-                <a16:creationId xmlns:a16="http://schemas.microsoft.com/office/drawing/2014/main" id="{4796ED21-6620-A881-49B3-800CF3A6530F}"/>
-              </a:ext>
-            </a:extLst>
-          </p:cNvPr>
-          <p:cNvSpPr txBox="1">
-            <a:spLocks noGrp="1"/>
-          </p:cNvSpPr>
-          <p:nvPr>
-            <p:ph type="body" idx="1"/>
-          </p:nvPr>
-        </p:nvSpPr>
-        <p:spPr>
-          <a:xfrm>
-            <a:off x="685800" y="4343400"/>
-            <a:ext cx="5486400" cy="4114800"/>
-          </a:xfrm>
-          <a:prstGeom prst="rect">
-            <a:avLst/>
-          </a:prstGeom>
-        </p:spPr>
-        <p:txBody>
-          <a:bodyPr spcFirstLastPara="1" wrap="square" lIns="91425" tIns="91425" rIns="91425" bIns="91425" anchor="t" anchorCtr="0">
-            <a:noAutofit/>
-          </a:bodyPr>
-          <a:lstStyle/>
-          <a:p>
-            <a:pPr marL="0" lvl="0" indent="0" algn="l" rtl="0">
-              <a:spcBef>
-                <a:spcPts val="0"/>
-              </a:spcBef>
-              <a:spcAft>
-                <a:spcPts val="0"/>
-              </a:spcAft>
-              <a:buNone/>
-            </a:pPr>
-            <a:endParaRPr/>
-          </a:p>
-        </p:txBody>
-      </p:sp>
-    </p:spTree>
-    <p:extLst>
-      <p:ext uri="{BB962C8B-B14F-4D97-AF65-F5344CB8AC3E}">
-        <p14:creationId xmlns:p14="http://schemas.microsoft.com/office/powerpoint/2010/main" val="2548069201"/>
-      </p:ext>
-    </p:extLst>
-  </p:cSld>
-  <p:clrMapOvr>
-    <a:masterClrMapping/>
-  </p:clrMapOvr>
-</p:notes>
-</file>
-
-<file path=ppt/notesSlides/notesSlide3.xml><?xml version="1.0" encoding="utf-8"?>
+<file path=ppt/notesSlides/notesSlide4.xml><?xml version="1.0" encoding="utf-8"?>
 <p:notes xmlns:a="http://schemas.openxmlformats.org/drawingml/2006/main" xmlns:r="http://schemas.openxmlformats.org/officeDocument/2006/relationships" xmlns:p="http://schemas.openxmlformats.org/presentationml/2006/main" showMasterSp="0" showMasterPhAnim="0">
   <p:cSld>
     <p:spTree>
@@ -2497,7 +2752,7 @@
 </p:notes>
 </file>
 
-<file path=ppt/notesSlides/notesSlide4.xml><?xml version="1.0" encoding="utf-8"?>
+<file path=ppt/notesSlides/notesSlide5.xml><?xml version="1.0" encoding="utf-8"?>
 <p:notes xmlns:a="http://schemas.openxmlformats.org/drawingml/2006/main" xmlns:r="http://schemas.openxmlformats.org/officeDocument/2006/relationships" xmlns:p="http://schemas.openxmlformats.org/presentationml/2006/main" showMasterSp="0" showMasterPhAnim="0">
   <p:cSld>
     <p:spTree>
@@ -2624,7 +2879,7 @@
 </p:notes>
 </file>
 
-<file path=ppt/notesSlides/notesSlide5.xml><?xml version="1.0" encoding="utf-8"?>
+<file path=ppt/notesSlides/notesSlide6.xml><?xml version="1.0" encoding="utf-8"?>
 <p:notes xmlns:a="http://schemas.openxmlformats.org/drawingml/2006/main" xmlns:r="http://schemas.openxmlformats.org/officeDocument/2006/relationships" xmlns:p="http://schemas.openxmlformats.org/presentationml/2006/main" showMasterSp="0" showMasterPhAnim="0">
   <p:cSld>
     <p:spTree>
@@ -2751,7 +3006,7 @@
 </p:notes>
 </file>
 
-<file path=ppt/notesSlides/notesSlide6.xml><?xml version="1.0" encoding="utf-8"?>
+<file path=ppt/notesSlides/notesSlide7.xml><?xml version="1.0" encoding="utf-8"?>
 <p:notes xmlns:a="http://schemas.openxmlformats.org/drawingml/2006/main" xmlns:r="http://schemas.openxmlformats.org/officeDocument/2006/relationships" xmlns:p="http://schemas.openxmlformats.org/presentationml/2006/main" showMasterSp="0" showMasterPhAnim="0">
   <p:cSld>
     <p:spTree>
@@ -2878,7 +3133,7 @@
 </p:notes>
 </file>
 
-<file path=ppt/notesSlides/notesSlide7.xml><?xml version="1.0" encoding="utf-8"?>
+<file path=ppt/notesSlides/notesSlide8.xml><?xml version="1.0" encoding="utf-8"?>
 <p:notes xmlns:a="http://schemas.openxmlformats.org/drawingml/2006/main" xmlns:r="http://schemas.openxmlformats.org/officeDocument/2006/relationships" xmlns:p="http://schemas.openxmlformats.org/presentationml/2006/main" showMasterSp="0" showMasterPhAnim="0">
   <p:cSld>
     <p:spTree>
@@ -3005,7 +3260,7 @@
 </p:notes>
 </file>
 
-<file path=ppt/notesSlides/notesSlide8.xml><?xml version="1.0" encoding="utf-8"?>
+<file path=ppt/notesSlides/notesSlide9.xml><?xml version="1.0" encoding="utf-8"?>
 <p:notes xmlns:a="http://schemas.openxmlformats.org/drawingml/2006/main" xmlns:r="http://schemas.openxmlformats.org/officeDocument/2006/relationships" xmlns:p="http://schemas.openxmlformats.org/presentationml/2006/main" showMasterSp="0" showMasterPhAnim="0">
   <p:cSld>
     <p:spTree>
@@ -3123,133 +3378,6 @@
     <p:extLst>
       <p:ext uri="{BB962C8B-B14F-4D97-AF65-F5344CB8AC3E}">
         <p14:creationId xmlns:p14="http://schemas.microsoft.com/office/powerpoint/2010/main" val="1838247361"/>
-      </p:ext>
-    </p:extLst>
-  </p:cSld>
-  <p:clrMapOvr>
-    <a:masterClrMapping/>
-  </p:clrMapOvr>
-</p:notes>
-</file>
-
-<file path=ppt/notesSlides/notesSlide9.xml><?xml version="1.0" encoding="utf-8"?>
-<p:notes xmlns:a="http://schemas.openxmlformats.org/drawingml/2006/main" xmlns:r="http://schemas.openxmlformats.org/officeDocument/2006/relationships" xmlns:p="http://schemas.openxmlformats.org/presentationml/2006/main" showMasterSp="0" showMasterPhAnim="0">
-  <p:cSld>
-    <p:spTree>
-      <p:nvGrpSpPr>
-        <p:cNvPr id="1" name="Shape 591">
-          <a:extLst>
-            <a:ext uri="{FF2B5EF4-FFF2-40B4-BE49-F238E27FC236}">
-              <a16:creationId xmlns:a16="http://schemas.microsoft.com/office/drawing/2014/main" id="{5C18A525-91DF-C815-8836-D80482781AFE}"/>
-            </a:ext>
-          </a:extLst>
-        </p:cNvPr>
-        <p:cNvGrpSpPr/>
-        <p:nvPr/>
-      </p:nvGrpSpPr>
-      <p:grpSpPr>
-        <a:xfrm>
-          <a:off x="0" y="0"/>
-          <a:ext cx="0" cy="0"/>
-          <a:chOff x="0" y="0"/>
-          <a:chExt cx="0" cy="0"/>
-        </a:xfrm>
-      </p:grpSpPr>
-      <p:sp>
-        <p:nvSpPr>
-          <p:cNvPr id="592" name="Google Shape;592;g54dda1946d_6_332:notes">
-            <a:extLst>
-              <a:ext uri="{FF2B5EF4-FFF2-40B4-BE49-F238E27FC236}">
-                <a16:creationId xmlns:a16="http://schemas.microsoft.com/office/drawing/2014/main" id="{17B0FA60-E911-FE24-38A3-62FF7B29122C}"/>
-              </a:ext>
-            </a:extLst>
-          </p:cNvPr>
-          <p:cNvSpPr>
-            <a:spLocks noGrp="1" noRot="1" noChangeAspect="1"/>
-          </p:cNvSpPr>
-          <p:nvPr>
-            <p:ph type="sldImg" idx="2"/>
-          </p:nvPr>
-        </p:nvSpPr>
-        <p:spPr>
-          <a:xfrm>
-            <a:off x="381000" y="685800"/>
-            <a:ext cx="6096000" cy="3429000"/>
-          </a:xfrm>
-          <a:custGeom>
-            <a:avLst/>
-            <a:gdLst/>
-            <a:ahLst/>
-            <a:cxnLst/>
-            <a:rect l="l" t="t" r="r" b="b"/>
-            <a:pathLst>
-              <a:path w="120000" h="120000" extrusionOk="0">
-                <a:moveTo>
-                  <a:pt x="0" y="0"/>
-                </a:moveTo>
-                <a:lnTo>
-                  <a:pt x="120000" y="0"/>
-                </a:lnTo>
-                <a:lnTo>
-                  <a:pt x="120000" y="120000"/>
-                </a:lnTo>
-                <a:lnTo>
-                  <a:pt x="0" y="120000"/>
-                </a:lnTo>
-                <a:close/>
-              </a:path>
-            </a:pathLst>
-          </a:custGeom>
-        </p:spPr>
-      </p:sp>
-      <p:sp>
-        <p:nvSpPr>
-          <p:cNvPr id="593" name="Google Shape;593;g54dda1946d_6_332:notes">
-            <a:extLst>
-              <a:ext uri="{FF2B5EF4-FFF2-40B4-BE49-F238E27FC236}">
-                <a16:creationId xmlns:a16="http://schemas.microsoft.com/office/drawing/2014/main" id="{24E62F68-D0AA-E7B3-D81D-FBFD86639227}"/>
-              </a:ext>
-            </a:extLst>
-          </p:cNvPr>
-          <p:cNvSpPr txBox="1">
-            <a:spLocks noGrp="1"/>
-          </p:cNvSpPr>
-          <p:nvPr>
-            <p:ph type="body" idx="1"/>
-          </p:nvPr>
-        </p:nvSpPr>
-        <p:spPr>
-          <a:xfrm>
-            <a:off x="685800" y="4343400"/>
-            <a:ext cx="5486400" cy="4114800"/>
-          </a:xfrm>
-          <a:prstGeom prst="rect">
-            <a:avLst/>
-          </a:prstGeom>
-        </p:spPr>
-        <p:txBody>
-          <a:bodyPr spcFirstLastPara="1" wrap="square" lIns="91425" tIns="91425" rIns="91425" bIns="91425" anchor="t" anchorCtr="0">
-            <a:noAutofit/>
-          </a:bodyPr>
-          <a:lstStyle/>
-          <a:p>
-            <a:pPr marL="0" lvl="0" indent="0" algn="l" rtl="0">
-              <a:spcBef>
-                <a:spcPts val="0"/>
-              </a:spcBef>
-              <a:spcAft>
-                <a:spcPts val="0"/>
-              </a:spcAft>
-              <a:buNone/>
-            </a:pPr>
-            <a:endParaRPr/>
-          </a:p>
-        </p:txBody>
-      </p:sp>
-    </p:spTree>
-    <p:extLst>
-      <p:ext uri="{BB962C8B-B14F-4D97-AF65-F5344CB8AC3E}">
-        <p14:creationId xmlns:p14="http://schemas.microsoft.com/office/powerpoint/2010/main" val="3625610259"/>
       </p:ext>
     </p:extLst>
   </p:cSld>
@@ -8102,6 +8230,72 @@
   <p:cSld>
     <p:spTree>
       <p:nvGrpSpPr>
+        <p:cNvPr id="1" name="Shape 594">
+          <a:extLst>
+            <a:ext uri="{FF2B5EF4-FFF2-40B4-BE49-F238E27FC236}">
+              <a16:creationId xmlns:a16="http://schemas.microsoft.com/office/drawing/2014/main" id="{B013FC76-882F-3444-97EF-A6AF89B0CFBD}"/>
+            </a:ext>
+          </a:extLst>
+        </p:cNvPr>
+        <p:cNvGrpSpPr/>
+        <p:nvPr/>
+      </p:nvGrpSpPr>
+      <p:grpSpPr>
+        <a:xfrm>
+          <a:off x="0" y="0"/>
+          <a:ext cx="0" cy="0"/>
+          <a:chOff x="0" y="0"/>
+          <a:chExt cx="0" cy="0"/>
+        </a:xfrm>
+      </p:grpSpPr>
+      <p:pic>
+        <p:nvPicPr>
+          <p:cNvPr id="8" name="Picture 7" descr="A screenshot of a computer&#10;&#10;Description automatically generated">
+            <a:extLst>
+              <a:ext uri="{FF2B5EF4-FFF2-40B4-BE49-F238E27FC236}">
+                <a16:creationId xmlns:a16="http://schemas.microsoft.com/office/drawing/2014/main" id="{56926993-6410-1566-3AD4-1C0C632DAEBD}"/>
+              </a:ext>
+            </a:extLst>
+          </p:cNvPr>
+          <p:cNvPicPr>
+            <a:picLocks noChangeAspect="1"/>
+          </p:cNvPicPr>
+          <p:nvPr/>
+        </p:nvPicPr>
+        <p:blipFill>
+          <a:blip r:embed="rId3"/>
+          <a:stretch>
+            <a:fillRect/>
+          </a:stretch>
+        </p:blipFill>
+        <p:spPr>
+          <a:xfrm>
+            <a:off x="276947" y="1158188"/>
+            <a:ext cx="8590105" cy="2827123"/>
+          </a:xfrm>
+          <a:prstGeom prst="rect">
+            <a:avLst/>
+          </a:prstGeom>
+        </p:spPr>
+      </p:pic>
+    </p:spTree>
+    <p:extLst>
+      <p:ext uri="{BB962C8B-B14F-4D97-AF65-F5344CB8AC3E}">
+        <p14:creationId xmlns:p14="http://schemas.microsoft.com/office/powerpoint/2010/main" val="3028487865"/>
+      </p:ext>
+    </p:extLst>
+  </p:cSld>
+  <p:clrMapOvr>
+    <a:masterClrMapping/>
+  </p:clrMapOvr>
+</p:sld>
+</file>
+
+<file path=ppt/slides/slide11.xml><?xml version="1.0" encoding="utf-8"?>
+<p:sld xmlns:a="http://schemas.openxmlformats.org/drawingml/2006/main" xmlns:r="http://schemas.openxmlformats.org/officeDocument/2006/relationships" xmlns:p="http://schemas.openxmlformats.org/presentationml/2006/main">
+  <p:cSld>
+    <p:spTree>
+      <p:nvGrpSpPr>
         <p:cNvPr id="1" name="Shape 328">
           <a:extLst>
             <a:ext uri="{FF2B5EF4-FFF2-40B4-BE49-F238E27FC236}">
@@ -8884,7 +9078,7 @@
 </p:sld>
 </file>
 
-<file path=ppt/slides/slide11.xml><?xml version="1.0" encoding="utf-8"?>
+<file path=ppt/slides/slide12.xml><?xml version="1.0" encoding="utf-8"?>
 <p:sld xmlns:a="http://schemas.openxmlformats.org/drawingml/2006/main" xmlns:r="http://schemas.openxmlformats.org/officeDocument/2006/relationships" xmlns:p="http://schemas.openxmlformats.org/presentationml/2006/main">
   <p:cSld>
     <p:spTree>
@@ -8950,7 +9144,7 @@
 </p:sld>
 </file>
 
-<file path=ppt/slides/slide12.xml><?xml version="1.0" encoding="utf-8"?>
+<file path=ppt/slides/slide13.xml><?xml version="1.0" encoding="utf-8"?>
 <p:sld xmlns:a="http://schemas.openxmlformats.org/drawingml/2006/main" xmlns:r="http://schemas.openxmlformats.org/officeDocument/2006/relationships" xmlns:p="http://schemas.openxmlformats.org/presentationml/2006/main">
   <p:cSld>
     <p:spTree>
@@ -9714,7 +9908,7 @@
 </p:sld>
 </file>
 
-<file path=ppt/slides/slide13.xml><?xml version="1.0" encoding="utf-8"?>
+<file path=ppt/slides/slide14.xml><?xml version="1.0" encoding="utf-8"?>
 <p:sld xmlns:a="http://schemas.openxmlformats.org/drawingml/2006/main" xmlns:r="http://schemas.openxmlformats.org/officeDocument/2006/relationships" xmlns:p="http://schemas.openxmlformats.org/presentationml/2006/main">
   <p:cSld>
     <p:spTree>
@@ -9780,7 +9974,7 @@
 </p:sld>
 </file>
 
-<file path=ppt/slides/slide14.xml><?xml version="1.0" encoding="utf-8"?>
+<file path=ppt/slides/slide15.xml><?xml version="1.0" encoding="utf-8"?>
 <p:sld xmlns:a="http://schemas.openxmlformats.org/drawingml/2006/main" xmlns:r="http://schemas.openxmlformats.org/officeDocument/2006/relationships" xmlns:p="http://schemas.openxmlformats.org/presentationml/2006/main">
   <p:cSld>
     <p:spTree>
@@ -10626,7 +10820,7 @@
 </p:sld>
 </file>
 
-<file path=ppt/slides/slide15.xml><?xml version="1.0" encoding="utf-8"?>
+<file path=ppt/slides/slide16.xml><?xml version="1.0" encoding="utf-8"?>
 <p:sld xmlns:a="http://schemas.openxmlformats.org/drawingml/2006/main" xmlns:r="http://schemas.openxmlformats.org/officeDocument/2006/relationships" xmlns:p="http://schemas.openxmlformats.org/presentationml/2006/main">
   <p:cSld>
     <p:spTree>
@@ -10692,7 +10886,7 @@
 </p:sld>
 </file>
 
-<file path=ppt/slides/slide16.xml><?xml version="1.0" encoding="utf-8"?>
+<file path=ppt/slides/slide17.xml><?xml version="1.0" encoding="utf-8"?>
 <p:sld xmlns:a="http://schemas.openxmlformats.org/drawingml/2006/main" xmlns:r="http://schemas.openxmlformats.org/officeDocument/2006/relationships" xmlns:p="http://schemas.openxmlformats.org/presentationml/2006/main">
   <p:cSld>
     <p:spTree>
@@ -11530,7 +11724,7 @@
 </p:sld>
 </file>
 
-<file path=ppt/slides/slide17.xml><?xml version="1.0" encoding="utf-8"?>
+<file path=ppt/slides/slide18.xml><?xml version="1.0" encoding="utf-8"?>
 <p:sld xmlns:a="http://schemas.openxmlformats.org/drawingml/2006/main" xmlns:r="http://schemas.openxmlformats.org/officeDocument/2006/relationships" xmlns:p="http://schemas.openxmlformats.org/presentationml/2006/main">
   <p:cSld>
     <p:spTree>
@@ -11596,7 +11790,7 @@
 </p:sld>
 </file>
 
-<file path=ppt/slides/slide18.xml><?xml version="1.0" encoding="utf-8"?>
+<file path=ppt/slides/slide19.xml><?xml version="1.0" encoding="utf-8"?>
 <p:sld xmlns:a="http://schemas.openxmlformats.org/drawingml/2006/main" xmlns:r="http://schemas.openxmlformats.org/officeDocument/2006/relationships" xmlns:p="http://schemas.openxmlformats.org/presentationml/2006/main">
   <p:cSld>
     <p:spTree>
@@ -12420,7 +12614,2410 @@
 </p:sld>
 </file>
 
-<file path=ppt/slides/slide19.xml><?xml version="1.0" encoding="utf-8"?>
+<file path=ppt/slides/slide2.xml><?xml version="1.0" encoding="utf-8"?>
+<p:sld xmlns:a="http://schemas.openxmlformats.org/drawingml/2006/main" xmlns:r="http://schemas.openxmlformats.org/officeDocument/2006/relationships" xmlns:p="http://schemas.openxmlformats.org/presentationml/2006/main">
+  <p:cSld>
+    <p:spTree>
+      <p:nvGrpSpPr>
+        <p:cNvPr id="1" name="Shape 618">
+          <a:extLst>
+            <a:ext uri="{FF2B5EF4-FFF2-40B4-BE49-F238E27FC236}">
+              <a16:creationId xmlns:a16="http://schemas.microsoft.com/office/drawing/2014/main" id="{99E71F6C-7ACE-A377-22CD-7325995554D9}"/>
+            </a:ext>
+          </a:extLst>
+        </p:cNvPr>
+        <p:cNvGrpSpPr/>
+        <p:nvPr/>
+      </p:nvGrpSpPr>
+      <p:grpSpPr>
+        <a:xfrm>
+          <a:off x="0" y="0"/>
+          <a:ext cx="0" cy="0"/>
+          <a:chOff x="0" y="0"/>
+          <a:chExt cx="0" cy="0"/>
+        </a:xfrm>
+      </p:grpSpPr>
+      <p:sp>
+        <p:nvSpPr>
+          <p:cNvPr id="619" name="Google Shape;619;p51">
+            <a:extLst>
+              <a:ext uri="{FF2B5EF4-FFF2-40B4-BE49-F238E27FC236}">
+                <a16:creationId xmlns:a16="http://schemas.microsoft.com/office/drawing/2014/main" id="{5D027EFE-6F29-C7D0-D482-FADF24F3C2EF}"/>
+              </a:ext>
+            </a:extLst>
+          </p:cNvPr>
+          <p:cNvSpPr txBox="1">
+            <a:spLocks noGrp="1"/>
+          </p:cNvSpPr>
+          <p:nvPr>
+            <p:ph type="title"/>
+          </p:nvPr>
+        </p:nvSpPr>
+        <p:spPr>
+          <a:xfrm>
+            <a:off x="722376" y="445025"/>
+            <a:ext cx="7708500" cy="572700"/>
+          </a:xfrm>
+          <a:prstGeom prst="rect">
+            <a:avLst/>
+          </a:prstGeom>
+        </p:spPr>
+        <p:txBody>
+          <a:bodyPr spcFirstLastPara="1" wrap="square" lIns="91425" tIns="91425" rIns="91425" bIns="91425" anchor="t" anchorCtr="0">
+            <a:noAutofit/>
+          </a:bodyPr>
+          <a:lstStyle/>
+          <a:p>
+            <a:pPr marL="0" lvl="0" indent="0" algn="l" rtl="0">
+              <a:spcBef>
+                <a:spcPts val="0"/>
+              </a:spcBef>
+              <a:spcAft>
+                <a:spcPts val="0"/>
+              </a:spcAft>
+              <a:buNone/>
+            </a:pPr>
+            <a:r>
+              <a:rPr lang="en" dirty="0" err="1"/>
+              <a:t>Założenia</a:t>
+            </a:r>
+            <a:r>
+              <a:rPr lang="en" dirty="0"/>
+              <a:t> </a:t>
+            </a:r>
+            <a:r>
+              <a:rPr lang="en" dirty="0" err="1"/>
+              <a:t>Projektu</a:t>
+            </a:r>
+            <a:endParaRPr dirty="0"/>
+          </a:p>
+        </p:txBody>
+      </p:sp>
+      <p:sp>
+        <p:nvSpPr>
+          <p:cNvPr id="624" name="Google Shape;624;p51">
+            <a:extLst>
+              <a:ext uri="{FF2B5EF4-FFF2-40B4-BE49-F238E27FC236}">
+                <a16:creationId xmlns:a16="http://schemas.microsoft.com/office/drawing/2014/main" id="{5385EAC3-CF87-70BF-2997-F6188D85E3C4}"/>
+              </a:ext>
+            </a:extLst>
+          </p:cNvPr>
+          <p:cNvSpPr txBox="1"/>
+          <p:nvPr/>
+        </p:nvSpPr>
+        <p:spPr>
+          <a:xfrm>
+            <a:off x="665800" y="2586275"/>
+            <a:ext cx="1374900" cy="478200"/>
+          </a:xfrm>
+          <a:prstGeom prst="rect">
+            <a:avLst/>
+          </a:prstGeom>
+          <a:noFill/>
+          <a:ln>
+            <a:noFill/>
+          </a:ln>
+        </p:spPr>
+        <p:txBody>
+          <a:bodyPr spcFirstLastPara="1" wrap="square" lIns="91425" tIns="91425" rIns="91425" bIns="91425" anchor="b" anchorCtr="0">
+            <a:noAutofit/>
+          </a:bodyPr>
+          <a:lstStyle/>
+          <a:p>
+            <a:pPr marL="0" marR="0" lvl="0" indent="0" algn="ctr" rtl="0">
+              <a:lnSpc>
+                <a:spcPct val="115000"/>
+              </a:lnSpc>
+              <a:spcBef>
+                <a:spcPts val="0"/>
+              </a:spcBef>
+              <a:spcAft>
+                <a:spcPts val="0"/>
+              </a:spcAft>
+              <a:buNone/>
+            </a:pPr>
+            <a:endParaRPr sz="1900" dirty="0">
+              <a:solidFill>
+                <a:schemeClr val="dk1"/>
+              </a:solidFill>
+              <a:latin typeface="Figtree Black"/>
+              <a:ea typeface="Figtree Black"/>
+              <a:cs typeface="Figtree Black"/>
+              <a:sym typeface="Figtree Black"/>
+            </a:endParaRPr>
+          </a:p>
+        </p:txBody>
+      </p:sp>
+      <p:sp>
+        <p:nvSpPr>
+          <p:cNvPr id="5" name="Google Shape;330;p36">
+            <a:extLst>
+              <a:ext uri="{FF2B5EF4-FFF2-40B4-BE49-F238E27FC236}">
+                <a16:creationId xmlns:a16="http://schemas.microsoft.com/office/drawing/2014/main" id="{E29E7393-9557-4678-5319-3E8551DE509D}"/>
+              </a:ext>
+            </a:extLst>
+          </p:cNvPr>
+          <p:cNvSpPr txBox="1">
+            <a:spLocks/>
+          </p:cNvSpPr>
+          <p:nvPr/>
+        </p:nvSpPr>
+        <p:spPr>
+          <a:xfrm>
+            <a:off x="722376" y="1359243"/>
+            <a:ext cx="7708500" cy="3229233"/>
+          </a:xfrm>
+          <a:prstGeom prst="rect">
+            <a:avLst/>
+          </a:prstGeom>
+        </p:spPr>
+        <p:txBody>
+          <a:bodyPr spcFirstLastPara="1" wrap="square" lIns="91425" tIns="91425" rIns="91425" bIns="91425" anchor="t" anchorCtr="0">
+            <a:noAutofit/>
+          </a:bodyPr>
+          <a:lstStyle>
+            <a:defPPr marR="0" lvl="0" algn="l" rtl="0">
+              <a:lnSpc>
+                <a:spcPct val="100000"/>
+              </a:lnSpc>
+              <a:spcBef>
+                <a:spcPts val="0"/>
+              </a:spcBef>
+              <a:spcAft>
+                <a:spcPts val="0"/>
+              </a:spcAft>
+            </a:defPPr>
+            <a:lvl1pPr marR="0" lvl="0" algn="l" rtl="0">
+              <a:lnSpc>
+                <a:spcPct val="100000"/>
+              </a:lnSpc>
+              <a:spcBef>
+                <a:spcPts val="0"/>
+              </a:spcBef>
+              <a:spcAft>
+                <a:spcPts val="0"/>
+              </a:spcAft>
+              <a:buClr>
+                <a:srgbClr val="000000"/>
+              </a:buClr>
+              <a:buFont typeface="Arial"/>
+              <a:defRPr sz="1400" b="0" i="0" u="none" strike="noStrike" cap="none">
+                <a:solidFill>
+                  <a:srgbClr val="000000"/>
+                </a:solidFill>
+                <a:latin typeface="Arial"/>
+                <a:ea typeface="Arial"/>
+                <a:cs typeface="Arial"/>
+                <a:sym typeface="Arial"/>
+              </a:defRPr>
+            </a:lvl1pPr>
+            <a:lvl2pPr marR="0" lvl="1" algn="l" rtl="0">
+              <a:lnSpc>
+                <a:spcPct val="100000"/>
+              </a:lnSpc>
+              <a:spcBef>
+                <a:spcPts val="0"/>
+              </a:spcBef>
+              <a:spcAft>
+                <a:spcPts val="0"/>
+              </a:spcAft>
+              <a:buClr>
+                <a:srgbClr val="000000"/>
+              </a:buClr>
+              <a:buFont typeface="Arial"/>
+              <a:defRPr sz="1400" b="0" i="0" u="none" strike="noStrike" cap="none">
+                <a:solidFill>
+                  <a:srgbClr val="000000"/>
+                </a:solidFill>
+                <a:latin typeface="Arial"/>
+                <a:ea typeface="Arial"/>
+                <a:cs typeface="Arial"/>
+                <a:sym typeface="Arial"/>
+              </a:defRPr>
+            </a:lvl2pPr>
+            <a:lvl3pPr marR="0" lvl="2" algn="l" rtl="0">
+              <a:lnSpc>
+                <a:spcPct val="100000"/>
+              </a:lnSpc>
+              <a:spcBef>
+                <a:spcPts val="0"/>
+              </a:spcBef>
+              <a:spcAft>
+                <a:spcPts val="0"/>
+              </a:spcAft>
+              <a:buClr>
+                <a:srgbClr val="000000"/>
+              </a:buClr>
+              <a:buFont typeface="Arial"/>
+              <a:defRPr sz="1400" b="0" i="0" u="none" strike="noStrike" cap="none">
+                <a:solidFill>
+                  <a:srgbClr val="000000"/>
+                </a:solidFill>
+                <a:latin typeface="Arial"/>
+                <a:ea typeface="Arial"/>
+                <a:cs typeface="Arial"/>
+                <a:sym typeface="Arial"/>
+              </a:defRPr>
+            </a:lvl3pPr>
+            <a:lvl4pPr marR="0" lvl="3" algn="l" rtl="0">
+              <a:lnSpc>
+                <a:spcPct val="100000"/>
+              </a:lnSpc>
+              <a:spcBef>
+                <a:spcPts val="0"/>
+              </a:spcBef>
+              <a:spcAft>
+                <a:spcPts val="0"/>
+              </a:spcAft>
+              <a:buClr>
+                <a:srgbClr val="000000"/>
+              </a:buClr>
+              <a:buFont typeface="Arial"/>
+              <a:defRPr sz="1400" b="0" i="0" u="none" strike="noStrike" cap="none">
+                <a:solidFill>
+                  <a:srgbClr val="000000"/>
+                </a:solidFill>
+                <a:latin typeface="Arial"/>
+                <a:ea typeface="Arial"/>
+                <a:cs typeface="Arial"/>
+                <a:sym typeface="Arial"/>
+              </a:defRPr>
+            </a:lvl4pPr>
+            <a:lvl5pPr marR="0" lvl="4" algn="l" rtl="0">
+              <a:lnSpc>
+                <a:spcPct val="100000"/>
+              </a:lnSpc>
+              <a:spcBef>
+                <a:spcPts val="0"/>
+              </a:spcBef>
+              <a:spcAft>
+                <a:spcPts val="0"/>
+              </a:spcAft>
+              <a:buClr>
+                <a:srgbClr val="000000"/>
+              </a:buClr>
+              <a:buFont typeface="Arial"/>
+              <a:defRPr sz="1400" b="0" i="0" u="none" strike="noStrike" cap="none">
+                <a:solidFill>
+                  <a:srgbClr val="000000"/>
+                </a:solidFill>
+                <a:latin typeface="Arial"/>
+                <a:ea typeface="Arial"/>
+                <a:cs typeface="Arial"/>
+                <a:sym typeface="Arial"/>
+              </a:defRPr>
+            </a:lvl5pPr>
+            <a:lvl6pPr marR="0" lvl="5" algn="l" rtl="0">
+              <a:lnSpc>
+                <a:spcPct val="100000"/>
+              </a:lnSpc>
+              <a:spcBef>
+                <a:spcPts val="0"/>
+              </a:spcBef>
+              <a:spcAft>
+                <a:spcPts val="0"/>
+              </a:spcAft>
+              <a:buClr>
+                <a:srgbClr val="000000"/>
+              </a:buClr>
+              <a:buFont typeface="Arial"/>
+              <a:defRPr sz="1400" b="0" i="0" u="none" strike="noStrike" cap="none">
+                <a:solidFill>
+                  <a:srgbClr val="000000"/>
+                </a:solidFill>
+                <a:latin typeface="Arial"/>
+                <a:ea typeface="Arial"/>
+                <a:cs typeface="Arial"/>
+                <a:sym typeface="Arial"/>
+              </a:defRPr>
+            </a:lvl6pPr>
+            <a:lvl7pPr marR="0" lvl="6" algn="l" rtl="0">
+              <a:lnSpc>
+                <a:spcPct val="100000"/>
+              </a:lnSpc>
+              <a:spcBef>
+                <a:spcPts val="0"/>
+              </a:spcBef>
+              <a:spcAft>
+                <a:spcPts val="0"/>
+              </a:spcAft>
+              <a:buClr>
+                <a:srgbClr val="000000"/>
+              </a:buClr>
+              <a:buFont typeface="Arial"/>
+              <a:defRPr sz="1400" b="0" i="0" u="none" strike="noStrike" cap="none">
+                <a:solidFill>
+                  <a:srgbClr val="000000"/>
+                </a:solidFill>
+                <a:latin typeface="Arial"/>
+                <a:ea typeface="Arial"/>
+                <a:cs typeface="Arial"/>
+                <a:sym typeface="Arial"/>
+              </a:defRPr>
+            </a:lvl7pPr>
+            <a:lvl8pPr marR="0" lvl="7" algn="l" rtl="0">
+              <a:lnSpc>
+                <a:spcPct val="100000"/>
+              </a:lnSpc>
+              <a:spcBef>
+                <a:spcPts val="0"/>
+              </a:spcBef>
+              <a:spcAft>
+                <a:spcPts val="0"/>
+              </a:spcAft>
+              <a:buClr>
+                <a:srgbClr val="000000"/>
+              </a:buClr>
+              <a:buFont typeface="Arial"/>
+              <a:defRPr sz="1400" b="0" i="0" u="none" strike="noStrike" cap="none">
+                <a:solidFill>
+                  <a:srgbClr val="000000"/>
+                </a:solidFill>
+                <a:latin typeface="Arial"/>
+                <a:ea typeface="Arial"/>
+                <a:cs typeface="Arial"/>
+                <a:sym typeface="Arial"/>
+              </a:defRPr>
+            </a:lvl8pPr>
+            <a:lvl9pPr marR="0" lvl="8" algn="l" rtl="0">
+              <a:lnSpc>
+                <a:spcPct val="100000"/>
+              </a:lnSpc>
+              <a:spcBef>
+                <a:spcPts val="0"/>
+              </a:spcBef>
+              <a:spcAft>
+                <a:spcPts val="0"/>
+              </a:spcAft>
+              <a:buClr>
+                <a:srgbClr val="000000"/>
+              </a:buClr>
+              <a:buFont typeface="Arial"/>
+              <a:defRPr sz="1400" b="0" i="0" u="none" strike="noStrike" cap="none">
+                <a:solidFill>
+                  <a:srgbClr val="000000"/>
+                </a:solidFill>
+                <a:latin typeface="Arial"/>
+                <a:ea typeface="Arial"/>
+                <a:cs typeface="Arial"/>
+                <a:sym typeface="Arial"/>
+              </a:defRPr>
+            </a:lvl9pPr>
+          </a:lstStyle>
+          <a:p>
+            <a:r>
+              <a:rPr lang="en-US" dirty="0" err="1">
+                <a:solidFill>
+                  <a:srgbClr val="000000"/>
+                </a:solidFill>
+                <a:effectLst/>
+                <a:latin typeface="Hanken Grotesk" pitchFamily="2" charset="77"/>
+              </a:rPr>
+              <a:t>Aplikacja</a:t>
+            </a:r>
+            <a:r>
+              <a:rPr lang="en-US" dirty="0">
+                <a:solidFill>
+                  <a:srgbClr val="000000"/>
+                </a:solidFill>
+                <a:effectLst/>
+                <a:latin typeface="Hanken Grotesk" pitchFamily="2" charset="77"/>
+              </a:rPr>
+              <a:t> </a:t>
+            </a:r>
+            <a:r>
+              <a:rPr lang="en-US" dirty="0" err="1">
+                <a:solidFill>
+                  <a:srgbClr val="000000"/>
+                </a:solidFill>
+                <a:effectLst/>
+                <a:latin typeface="Hanken Grotesk" pitchFamily="2" charset="77"/>
+              </a:rPr>
+              <a:t>umożliwia</a:t>
+            </a:r>
+            <a:r>
+              <a:rPr lang="en-US" dirty="0">
+                <a:solidFill>
+                  <a:srgbClr val="000000"/>
+                </a:solidFill>
+                <a:effectLst/>
+                <a:latin typeface="Hanken Grotesk" pitchFamily="2" charset="77"/>
+              </a:rPr>
+              <a:t> </a:t>
+            </a:r>
+            <a:r>
+              <a:rPr lang="en-US" dirty="0" err="1">
+                <a:solidFill>
+                  <a:srgbClr val="000000"/>
+                </a:solidFill>
+                <a:effectLst/>
+                <a:latin typeface="Hanken Grotesk" pitchFamily="2" charset="77"/>
+              </a:rPr>
+              <a:t>użytkownikowi</a:t>
+            </a:r>
+            <a:r>
+              <a:rPr lang="en-US" dirty="0">
+                <a:solidFill>
+                  <a:srgbClr val="000000"/>
+                </a:solidFill>
+                <a:effectLst/>
+                <a:latin typeface="Hanken Grotesk" pitchFamily="2" charset="77"/>
+              </a:rPr>
+              <a:t> </a:t>
+            </a:r>
+            <a:r>
+              <a:rPr lang="en-US" b="1" dirty="0" err="1">
+                <a:solidFill>
+                  <a:srgbClr val="000000"/>
+                </a:solidFill>
+                <a:effectLst/>
+                <a:latin typeface="Hanken Grotesk" pitchFamily="2" charset="77"/>
+              </a:rPr>
+              <a:t>przyswajanie</a:t>
+            </a:r>
+            <a:r>
+              <a:rPr lang="en-US" b="1" dirty="0">
+                <a:solidFill>
+                  <a:srgbClr val="000000"/>
+                </a:solidFill>
+                <a:effectLst/>
+                <a:latin typeface="Hanken Grotesk" pitchFamily="2" charset="77"/>
+              </a:rPr>
+              <a:t> </a:t>
+            </a:r>
+            <a:r>
+              <a:rPr lang="en-US" b="1" dirty="0" err="1">
+                <a:solidFill>
+                  <a:srgbClr val="000000"/>
+                </a:solidFill>
+                <a:effectLst/>
+                <a:latin typeface="Hanken Grotesk" pitchFamily="2" charset="77"/>
+              </a:rPr>
+              <a:t>słownictwa</a:t>
+            </a:r>
+            <a:r>
+              <a:rPr lang="en-US" dirty="0">
+                <a:solidFill>
+                  <a:srgbClr val="000000"/>
+                </a:solidFill>
+                <a:effectLst/>
+                <a:latin typeface="Hanken Grotesk" pitchFamily="2" charset="77"/>
+              </a:rPr>
+              <a:t> </a:t>
+            </a:r>
+            <a:r>
+              <a:rPr lang="en-US" dirty="0" err="1">
+                <a:solidFill>
+                  <a:srgbClr val="000000"/>
+                </a:solidFill>
+                <a:effectLst/>
+                <a:latin typeface="Hanken Grotesk" pitchFamily="2" charset="77"/>
+              </a:rPr>
+              <a:t>oraz</a:t>
+            </a:r>
+            <a:r>
+              <a:rPr lang="en-US" dirty="0">
+                <a:solidFill>
+                  <a:srgbClr val="000000"/>
+                </a:solidFill>
+                <a:effectLst/>
+                <a:latin typeface="Hanken Grotesk" pitchFamily="2" charset="77"/>
+              </a:rPr>
+              <a:t> </a:t>
+            </a:r>
+            <a:r>
+              <a:rPr lang="en-US" b="1" dirty="0" err="1">
+                <a:solidFill>
+                  <a:srgbClr val="000000"/>
+                </a:solidFill>
+                <a:effectLst/>
+                <a:latin typeface="Hanken Grotesk" pitchFamily="2" charset="77"/>
+              </a:rPr>
+              <a:t>sprawdzanie</a:t>
+            </a:r>
+            <a:r>
+              <a:rPr lang="en-US" b="1" dirty="0">
+                <a:solidFill>
+                  <a:srgbClr val="000000"/>
+                </a:solidFill>
+                <a:effectLst/>
+                <a:latin typeface="Hanken Grotesk" pitchFamily="2" charset="77"/>
+              </a:rPr>
+              <a:t> </a:t>
+            </a:r>
+            <a:r>
+              <a:rPr lang="en-US" b="1" dirty="0" err="1">
+                <a:solidFill>
+                  <a:srgbClr val="000000"/>
+                </a:solidFill>
+                <a:effectLst/>
+                <a:latin typeface="Hanken Grotesk" pitchFamily="2" charset="77"/>
+              </a:rPr>
+              <a:t>swojej</a:t>
+            </a:r>
+            <a:r>
+              <a:rPr lang="en-US" b="1" dirty="0">
+                <a:solidFill>
+                  <a:srgbClr val="000000"/>
+                </a:solidFill>
+                <a:effectLst/>
+                <a:latin typeface="Hanken Grotesk" pitchFamily="2" charset="77"/>
+              </a:rPr>
+              <a:t> </a:t>
+            </a:r>
+            <a:r>
+              <a:rPr lang="en-US" b="1" dirty="0" err="1">
+                <a:solidFill>
+                  <a:srgbClr val="000000"/>
+                </a:solidFill>
+                <a:effectLst/>
+                <a:latin typeface="Hanken Grotesk" pitchFamily="2" charset="77"/>
+              </a:rPr>
+              <a:t>wiedzy</a:t>
+            </a:r>
+            <a:r>
+              <a:rPr lang="en-US" b="1" dirty="0">
+                <a:solidFill>
+                  <a:srgbClr val="000000"/>
+                </a:solidFill>
+                <a:effectLst/>
+                <a:latin typeface="Hanken Grotesk" pitchFamily="2" charset="77"/>
+              </a:rPr>
+              <a:t> w </a:t>
+            </a:r>
+            <a:r>
+              <a:rPr lang="en-US" b="1" dirty="0" err="1">
+                <a:solidFill>
+                  <a:srgbClr val="000000"/>
+                </a:solidFill>
+                <a:effectLst/>
+                <a:latin typeface="Hanken Grotesk" pitchFamily="2" charset="77"/>
+              </a:rPr>
+              <a:t>różnych</a:t>
+            </a:r>
+            <a:r>
+              <a:rPr lang="en-US" b="1" dirty="0">
+                <a:solidFill>
+                  <a:srgbClr val="000000"/>
+                </a:solidFill>
+                <a:effectLst/>
+                <a:latin typeface="Hanken Grotesk" pitchFamily="2" charset="77"/>
+              </a:rPr>
+              <a:t> </a:t>
+            </a:r>
+            <a:r>
+              <a:rPr lang="en-US" b="1" dirty="0" err="1">
+                <a:solidFill>
+                  <a:srgbClr val="000000"/>
+                </a:solidFill>
+                <a:effectLst/>
+                <a:latin typeface="Hanken Grotesk" pitchFamily="2" charset="77"/>
+              </a:rPr>
+              <a:t>trybach</a:t>
+            </a:r>
+            <a:r>
+              <a:rPr lang="en-US" b="1" dirty="0">
+                <a:solidFill>
+                  <a:srgbClr val="000000"/>
+                </a:solidFill>
+                <a:effectLst/>
+                <a:latin typeface="Hanken Grotesk" pitchFamily="2" charset="77"/>
+              </a:rPr>
+              <a:t> </a:t>
+            </a:r>
+            <a:r>
+              <a:rPr lang="en-US" b="1" dirty="0" err="1">
+                <a:solidFill>
+                  <a:srgbClr val="000000"/>
+                </a:solidFill>
+                <a:effectLst/>
+                <a:latin typeface="Hanken Grotesk" pitchFamily="2" charset="77"/>
+              </a:rPr>
+              <a:t>nauki</a:t>
+            </a:r>
+            <a:r>
+              <a:rPr lang="en-US" dirty="0">
+                <a:solidFill>
+                  <a:srgbClr val="000000"/>
+                </a:solidFill>
+                <a:effectLst/>
+                <a:latin typeface="Hanken Grotesk" pitchFamily="2" charset="77"/>
+              </a:rPr>
+              <a:t>, </a:t>
+            </a:r>
+            <a:r>
+              <a:rPr lang="en-US" dirty="0" err="1">
+                <a:solidFill>
+                  <a:srgbClr val="000000"/>
+                </a:solidFill>
+                <a:effectLst/>
+                <a:latin typeface="Hanken Grotesk" pitchFamily="2" charset="77"/>
+              </a:rPr>
+              <a:t>takich</a:t>
+            </a:r>
+            <a:r>
+              <a:rPr lang="en-US" dirty="0">
+                <a:solidFill>
+                  <a:srgbClr val="000000"/>
+                </a:solidFill>
+                <a:effectLst/>
+                <a:latin typeface="Hanken Grotesk" pitchFamily="2" charset="77"/>
+              </a:rPr>
+              <a:t> jak </a:t>
+            </a:r>
+            <a:r>
+              <a:rPr lang="en-US" dirty="0" err="1">
+                <a:solidFill>
+                  <a:srgbClr val="000000"/>
+                </a:solidFill>
+                <a:effectLst/>
+                <a:latin typeface="Hanken Grotesk" pitchFamily="2" charset="77"/>
+              </a:rPr>
+              <a:t>fiszki</a:t>
+            </a:r>
+            <a:r>
+              <a:rPr lang="en-US" dirty="0">
+                <a:solidFill>
+                  <a:srgbClr val="000000"/>
+                </a:solidFill>
+                <a:effectLst/>
+                <a:latin typeface="Hanken Grotesk" pitchFamily="2" charset="77"/>
+              </a:rPr>
+              <a:t> (</a:t>
+            </a:r>
+            <a:r>
+              <a:rPr lang="en-US" dirty="0" err="1">
+                <a:solidFill>
+                  <a:srgbClr val="000000"/>
+                </a:solidFill>
+                <a:effectLst/>
+                <a:latin typeface="Hanken Grotesk" pitchFamily="2" charset="77"/>
+              </a:rPr>
+              <a:t>wyświetlanie</a:t>
+            </a:r>
+            <a:r>
+              <a:rPr lang="en-US" dirty="0">
+                <a:solidFill>
+                  <a:srgbClr val="000000"/>
+                </a:solidFill>
+                <a:effectLst/>
+                <a:latin typeface="Hanken Grotesk" pitchFamily="2" charset="77"/>
+              </a:rPr>
+              <a:t> </a:t>
+            </a:r>
+            <a:r>
+              <a:rPr lang="en-US" dirty="0" err="1">
+                <a:solidFill>
+                  <a:srgbClr val="000000"/>
+                </a:solidFill>
+                <a:effectLst/>
+                <a:latin typeface="Hanken Grotesk" pitchFamily="2" charset="77"/>
+              </a:rPr>
+              <a:t>słowa</a:t>
+            </a:r>
+            <a:r>
+              <a:rPr lang="en-US" dirty="0">
+                <a:solidFill>
+                  <a:srgbClr val="000000"/>
+                </a:solidFill>
+                <a:effectLst/>
+                <a:latin typeface="Hanken Grotesk" pitchFamily="2" charset="77"/>
+              </a:rPr>
+              <a:t> </a:t>
+            </a:r>
+            <a:r>
+              <a:rPr lang="en-US" dirty="0" err="1">
+                <a:solidFill>
+                  <a:srgbClr val="000000"/>
+                </a:solidFill>
+                <a:effectLst/>
+                <a:latin typeface="Hanken Grotesk" pitchFamily="2" charset="77"/>
+              </a:rPr>
+              <a:t>lub</a:t>
+            </a:r>
+            <a:r>
+              <a:rPr lang="en-US" dirty="0">
+                <a:solidFill>
+                  <a:srgbClr val="000000"/>
+                </a:solidFill>
+                <a:effectLst/>
+                <a:latin typeface="Hanken Grotesk" pitchFamily="2" charset="77"/>
+              </a:rPr>
+              <a:t> </a:t>
+            </a:r>
+            <a:r>
+              <a:rPr lang="en-US" dirty="0" err="1">
+                <a:solidFill>
+                  <a:srgbClr val="000000"/>
+                </a:solidFill>
+                <a:effectLst/>
+                <a:latin typeface="Hanken Grotesk" pitchFamily="2" charset="77"/>
+              </a:rPr>
+              <a:t>tłumaczenia</a:t>
+            </a:r>
+            <a:r>
+              <a:rPr lang="en-US" dirty="0">
+                <a:solidFill>
+                  <a:srgbClr val="000000"/>
+                </a:solidFill>
+                <a:effectLst/>
+                <a:latin typeface="Hanken Grotesk" pitchFamily="2" charset="77"/>
+              </a:rPr>
+              <a:t> z </a:t>
+            </a:r>
+            <a:r>
+              <a:rPr lang="en-US" dirty="0" err="1">
+                <a:solidFill>
+                  <a:srgbClr val="000000"/>
+                </a:solidFill>
+                <a:effectLst/>
+                <a:latin typeface="Hanken Grotesk" pitchFamily="2" charset="77"/>
+              </a:rPr>
+              <a:t>oczekiwaniem</a:t>
+            </a:r>
+            <a:r>
+              <a:rPr lang="en-US" dirty="0">
+                <a:solidFill>
+                  <a:srgbClr val="000000"/>
+                </a:solidFill>
+                <a:effectLst/>
+                <a:latin typeface="Hanken Grotesk" pitchFamily="2" charset="77"/>
+              </a:rPr>
+              <a:t> </a:t>
+            </a:r>
+            <a:r>
+              <a:rPr lang="en-US" dirty="0" err="1">
+                <a:solidFill>
+                  <a:srgbClr val="000000"/>
+                </a:solidFill>
+                <a:effectLst/>
+                <a:latin typeface="Hanken Grotesk" pitchFamily="2" charset="77"/>
+              </a:rPr>
+              <a:t>na</a:t>
+            </a:r>
+            <a:r>
+              <a:rPr lang="en-US" dirty="0">
+                <a:solidFill>
+                  <a:srgbClr val="000000"/>
+                </a:solidFill>
+                <a:effectLst/>
+                <a:latin typeface="Hanken Grotesk" pitchFamily="2" charset="77"/>
+              </a:rPr>
+              <a:t> </a:t>
+            </a:r>
+            <a:r>
+              <a:rPr lang="en-US" dirty="0" err="1">
+                <a:solidFill>
+                  <a:srgbClr val="000000"/>
+                </a:solidFill>
+                <a:effectLst/>
+                <a:latin typeface="Hanken Grotesk" pitchFamily="2" charset="77"/>
+              </a:rPr>
+              <a:t>odpowiedź</a:t>
+            </a:r>
+            <a:r>
+              <a:rPr lang="en-US" dirty="0">
+                <a:solidFill>
+                  <a:srgbClr val="000000"/>
+                </a:solidFill>
+                <a:effectLst/>
+                <a:latin typeface="Hanken Grotesk" pitchFamily="2" charset="77"/>
+              </a:rPr>
+              <a:t> </a:t>
+            </a:r>
+            <a:r>
+              <a:rPr lang="en-US" dirty="0" err="1">
+                <a:solidFill>
+                  <a:srgbClr val="000000"/>
+                </a:solidFill>
+                <a:effectLst/>
+                <a:latin typeface="Hanken Grotesk" pitchFamily="2" charset="77"/>
+              </a:rPr>
+              <a:t>i</a:t>
+            </a:r>
+            <a:r>
+              <a:rPr lang="en-US" dirty="0">
+                <a:solidFill>
+                  <a:srgbClr val="000000"/>
+                </a:solidFill>
+                <a:effectLst/>
+                <a:latin typeface="Hanken Grotesk" pitchFamily="2" charset="77"/>
+              </a:rPr>
+              <a:t> </a:t>
+            </a:r>
+            <a:r>
+              <a:rPr lang="en-US" dirty="0" err="1">
+                <a:solidFill>
+                  <a:srgbClr val="000000"/>
+                </a:solidFill>
+                <a:effectLst/>
+                <a:latin typeface="Hanken Grotesk" pitchFamily="2" charset="77"/>
+              </a:rPr>
+              <a:t>prezentacja</a:t>
+            </a:r>
+            <a:r>
+              <a:rPr lang="en-US" dirty="0">
+                <a:solidFill>
+                  <a:srgbClr val="000000"/>
+                </a:solidFill>
+                <a:effectLst/>
+                <a:latin typeface="Hanken Grotesk" pitchFamily="2" charset="77"/>
+              </a:rPr>
+              <a:t> </a:t>
+            </a:r>
+            <a:r>
+              <a:rPr lang="en-US" dirty="0" err="1">
+                <a:solidFill>
+                  <a:srgbClr val="000000"/>
+                </a:solidFill>
+                <a:effectLst/>
+                <a:latin typeface="Hanken Grotesk" pitchFamily="2" charset="77"/>
+              </a:rPr>
+              <a:t>poprawnej</a:t>
+            </a:r>
+            <a:r>
+              <a:rPr lang="en-US" dirty="0">
+                <a:solidFill>
+                  <a:srgbClr val="000000"/>
+                </a:solidFill>
+                <a:effectLst/>
+                <a:latin typeface="Hanken Grotesk" pitchFamily="2" charset="77"/>
+              </a:rPr>
+              <a:t> </a:t>
+            </a:r>
+            <a:r>
+              <a:rPr lang="en-US" dirty="0" err="1">
+                <a:solidFill>
+                  <a:srgbClr val="000000"/>
+                </a:solidFill>
+                <a:effectLst/>
+                <a:latin typeface="Hanken Grotesk" pitchFamily="2" charset="77"/>
+              </a:rPr>
+              <a:t>odpowiedzi</a:t>
+            </a:r>
+            <a:r>
+              <a:rPr lang="en-US" dirty="0">
+                <a:solidFill>
+                  <a:srgbClr val="000000"/>
+                </a:solidFill>
+                <a:effectLst/>
+                <a:latin typeface="Hanken Grotesk" pitchFamily="2" charset="77"/>
+              </a:rPr>
+              <a:t>), </a:t>
+            </a:r>
+            <a:r>
+              <a:rPr lang="en-US" dirty="0" err="1">
+                <a:solidFill>
+                  <a:srgbClr val="000000"/>
+                </a:solidFill>
+                <a:effectLst/>
+                <a:latin typeface="Hanken Grotesk" pitchFamily="2" charset="77"/>
+              </a:rPr>
+              <a:t>wybór</a:t>
+            </a:r>
+            <a:r>
+              <a:rPr lang="en-US" dirty="0">
+                <a:solidFill>
+                  <a:srgbClr val="000000"/>
+                </a:solidFill>
+                <a:effectLst/>
+                <a:latin typeface="Hanken Grotesk" pitchFamily="2" charset="77"/>
+              </a:rPr>
+              <a:t> </a:t>
+            </a:r>
+            <a:r>
+              <a:rPr lang="en-US" dirty="0" err="1">
+                <a:solidFill>
+                  <a:srgbClr val="000000"/>
+                </a:solidFill>
+                <a:effectLst/>
+                <a:latin typeface="Hanken Grotesk" pitchFamily="2" charset="77"/>
+              </a:rPr>
+              <a:t>poprawnego</a:t>
+            </a:r>
+            <a:r>
+              <a:rPr lang="en-US" dirty="0">
+                <a:solidFill>
+                  <a:srgbClr val="000000"/>
+                </a:solidFill>
+                <a:effectLst/>
+                <a:latin typeface="Hanken Grotesk" pitchFamily="2" charset="77"/>
+              </a:rPr>
+              <a:t> </a:t>
+            </a:r>
+            <a:r>
+              <a:rPr lang="en-US" dirty="0" err="1">
+                <a:solidFill>
+                  <a:srgbClr val="000000"/>
+                </a:solidFill>
+                <a:effectLst/>
+                <a:latin typeface="Hanken Grotesk" pitchFamily="2" charset="77"/>
+              </a:rPr>
+              <a:t>tłumaczenia</a:t>
+            </a:r>
+            <a:r>
+              <a:rPr lang="en-US" dirty="0">
+                <a:solidFill>
+                  <a:srgbClr val="000000"/>
+                </a:solidFill>
+                <a:effectLst/>
+                <a:latin typeface="Hanken Grotesk" pitchFamily="2" charset="77"/>
+              </a:rPr>
+              <a:t> </a:t>
+            </a:r>
+            <a:r>
+              <a:rPr lang="en-US" dirty="0" err="1">
+                <a:solidFill>
+                  <a:srgbClr val="000000"/>
+                </a:solidFill>
+                <a:effectLst/>
+                <a:latin typeface="Hanken Grotesk" pitchFamily="2" charset="77"/>
+              </a:rPr>
+              <a:t>spośród</a:t>
+            </a:r>
+            <a:r>
+              <a:rPr lang="en-US" dirty="0">
+                <a:solidFill>
+                  <a:srgbClr val="000000"/>
+                </a:solidFill>
+                <a:effectLst/>
+                <a:latin typeface="Hanken Grotesk" pitchFamily="2" charset="77"/>
+              </a:rPr>
+              <a:t> </a:t>
+            </a:r>
+            <a:r>
+              <a:rPr lang="en-US" dirty="0" err="1">
+                <a:solidFill>
+                  <a:srgbClr val="000000"/>
+                </a:solidFill>
+                <a:effectLst/>
+                <a:latin typeface="Hanken Grotesk" pitchFamily="2" charset="77"/>
+              </a:rPr>
+              <a:t>kilku</a:t>
+            </a:r>
+            <a:r>
+              <a:rPr lang="en-US" dirty="0">
+                <a:solidFill>
+                  <a:srgbClr val="000000"/>
+                </a:solidFill>
+                <a:effectLst/>
+                <a:latin typeface="Hanken Grotesk" pitchFamily="2" charset="77"/>
+              </a:rPr>
+              <a:t> </a:t>
+            </a:r>
+            <a:r>
+              <a:rPr lang="en-US" dirty="0" err="1">
+                <a:solidFill>
+                  <a:srgbClr val="000000"/>
+                </a:solidFill>
+                <a:effectLst/>
+                <a:latin typeface="Hanken Grotesk" pitchFamily="2" charset="77"/>
+              </a:rPr>
+              <a:t>opcji</a:t>
+            </a:r>
+            <a:r>
+              <a:rPr lang="en-US" dirty="0">
+                <a:solidFill>
+                  <a:srgbClr val="000000"/>
+                </a:solidFill>
+                <a:effectLst/>
+                <a:latin typeface="Hanken Grotesk" pitchFamily="2" charset="77"/>
+              </a:rPr>
+              <a:t> </a:t>
+            </a:r>
+            <a:r>
+              <a:rPr lang="en-US" dirty="0" err="1">
+                <a:solidFill>
+                  <a:srgbClr val="000000"/>
+                </a:solidFill>
+                <a:effectLst/>
+                <a:latin typeface="Hanken Grotesk" pitchFamily="2" charset="77"/>
+              </a:rPr>
+              <a:t>oraz</a:t>
+            </a:r>
+            <a:r>
+              <a:rPr lang="en-US" dirty="0">
+                <a:solidFill>
+                  <a:srgbClr val="000000"/>
+                </a:solidFill>
+                <a:effectLst/>
+                <a:latin typeface="Hanken Grotesk" pitchFamily="2" charset="77"/>
+              </a:rPr>
+              <a:t> </a:t>
+            </a:r>
+            <a:r>
+              <a:rPr lang="en-US" dirty="0" err="1">
+                <a:solidFill>
+                  <a:srgbClr val="000000"/>
+                </a:solidFill>
+                <a:effectLst/>
+                <a:latin typeface="Hanken Grotesk" pitchFamily="2" charset="77"/>
+              </a:rPr>
+              <a:t>wpisywanie</a:t>
+            </a:r>
+            <a:r>
+              <a:rPr lang="en-US" dirty="0">
+                <a:solidFill>
+                  <a:srgbClr val="000000"/>
+                </a:solidFill>
+                <a:effectLst/>
+                <a:latin typeface="Hanken Grotesk" pitchFamily="2" charset="77"/>
+              </a:rPr>
+              <a:t> </a:t>
+            </a:r>
+            <a:r>
+              <a:rPr lang="en-US" dirty="0" err="1">
+                <a:solidFill>
+                  <a:srgbClr val="000000"/>
+                </a:solidFill>
+                <a:effectLst/>
+                <a:latin typeface="Hanken Grotesk" pitchFamily="2" charset="77"/>
+              </a:rPr>
+              <a:t>słów</a:t>
+            </a:r>
+            <a:r>
+              <a:rPr lang="en-US" dirty="0">
+                <a:solidFill>
+                  <a:srgbClr val="000000"/>
+                </a:solidFill>
+                <a:effectLst/>
+                <a:latin typeface="Hanken Grotesk" pitchFamily="2" charset="77"/>
+              </a:rPr>
+              <a:t> w </a:t>
+            </a:r>
+            <a:r>
+              <a:rPr lang="en-US" dirty="0" err="1">
+                <a:solidFill>
+                  <a:srgbClr val="000000"/>
+                </a:solidFill>
+                <a:effectLst/>
+                <a:latin typeface="Hanken Grotesk" pitchFamily="2" charset="77"/>
+              </a:rPr>
+              <a:t>zdania</a:t>
+            </a:r>
+            <a:r>
+              <a:rPr lang="en-US" dirty="0">
+                <a:solidFill>
+                  <a:srgbClr val="000000"/>
+                </a:solidFill>
+                <a:effectLst/>
+                <a:latin typeface="Hanken Grotesk" pitchFamily="2" charset="77"/>
+              </a:rPr>
+              <a:t>. </a:t>
+            </a:r>
+            <a:r>
+              <a:rPr lang="en-US" b="1" dirty="0" err="1">
+                <a:solidFill>
+                  <a:srgbClr val="000000"/>
+                </a:solidFill>
+                <a:effectLst/>
+                <a:latin typeface="Hanken Grotesk" pitchFamily="2" charset="77"/>
+              </a:rPr>
+              <a:t>Zachęca</a:t>
+            </a:r>
+            <a:r>
+              <a:rPr lang="en-US" b="1" dirty="0">
+                <a:solidFill>
+                  <a:srgbClr val="000000"/>
+                </a:solidFill>
+                <a:effectLst/>
+                <a:latin typeface="Hanken Grotesk" pitchFamily="2" charset="77"/>
+              </a:rPr>
+              <a:t> do </a:t>
+            </a:r>
+            <a:r>
+              <a:rPr lang="en-US" b="1" dirty="0" err="1">
+                <a:solidFill>
+                  <a:srgbClr val="000000"/>
+                </a:solidFill>
+                <a:effectLst/>
+                <a:latin typeface="Hanken Grotesk" pitchFamily="2" charset="77"/>
+              </a:rPr>
+              <a:t>regularnej</a:t>
+            </a:r>
+            <a:r>
+              <a:rPr lang="en-US" b="1" dirty="0">
+                <a:solidFill>
+                  <a:srgbClr val="000000"/>
+                </a:solidFill>
+                <a:effectLst/>
+                <a:latin typeface="Hanken Grotesk" pitchFamily="2" charset="77"/>
+              </a:rPr>
+              <a:t> </a:t>
+            </a:r>
+            <a:r>
+              <a:rPr lang="en-US" b="1" dirty="0" err="1">
+                <a:solidFill>
+                  <a:srgbClr val="000000"/>
+                </a:solidFill>
+                <a:effectLst/>
+                <a:latin typeface="Hanken Grotesk" pitchFamily="2" charset="77"/>
+              </a:rPr>
+              <a:t>nauki</a:t>
+            </a:r>
+            <a:r>
+              <a:rPr lang="en-US" b="1" dirty="0">
+                <a:solidFill>
+                  <a:srgbClr val="000000"/>
+                </a:solidFill>
+                <a:effectLst/>
+                <a:latin typeface="Hanken Grotesk" pitchFamily="2" charset="77"/>
+              </a:rPr>
+              <a:t> </a:t>
+            </a:r>
+            <a:r>
+              <a:rPr lang="en-US" dirty="0" err="1">
+                <a:solidFill>
+                  <a:srgbClr val="000000"/>
+                </a:solidFill>
+                <a:effectLst/>
+                <a:latin typeface="Hanken Grotesk" pitchFamily="2" charset="77"/>
+              </a:rPr>
+              <a:t>poprzez</a:t>
+            </a:r>
+            <a:r>
+              <a:rPr lang="en-US" dirty="0">
+                <a:solidFill>
+                  <a:srgbClr val="000000"/>
+                </a:solidFill>
+                <a:effectLst/>
+                <a:latin typeface="Hanken Grotesk" pitchFamily="2" charset="77"/>
+              </a:rPr>
+              <a:t> </a:t>
+            </a:r>
+            <a:r>
+              <a:rPr lang="en-US" b="1" dirty="0" err="1">
+                <a:solidFill>
+                  <a:srgbClr val="000000"/>
+                </a:solidFill>
+                <a:effectLst/>
+                <a:latin typeface="Hanken Grotesk" pitchFamily="2" charset="77"/>
+              </a:rPr>
+              <a:t>codzienne</a:t>
+            </a:r>
+            <a:r>
+              <a:rPr lang="en-US" b="1" dirty="0">
+                <a:solidFill>
+                  <a:srgbClr val="000000"/>
+                </a:solidFill>
+                <a:effectLst/>
+                <a:latin typeface="Hanken Grotesk" pitchFamily="2" charset="77"/>
+              </a:rPr>
+              <a:t> </a:t>
+            </a:r>
+            <a:r>
+              <a:rPr lang="en-US" b="1" dirty="0" err="1">
+                <a:solidFill>
+                  <a:srgbClr val="000000"/>
+                </a:solidFill>
+                <a:effectLst/>
+                <a:latin typeface="Hanken Grotesk" pitchFamily="2" charset="77"/>
+              </a:rPr>
+              <a:t>wyzwania</a:t>
+            </a:r>
+            <a:r>
+              <a:rPr lang="en-US" dirty="0">
+                <a:solidFill>
+                  <a:srgbClr val="000000"/>
+                </a:solidFill>
+                <a:effectLst/>
+                <a:latin typeface="Hanken Grotesk" pitchFamily="2" charset="77"/>
+              </a:rPr>
+              <a:t> </a:t>
+            </a:r>
+            <a:r>
+              <a:rPr lang="en-US" dirty="0" err="1">
+                <a:solidFill>
+                  <a:srgbClr val="000000"/>
+                </a:solidFill>
+                <a:effectLst/>
+                <a:latin typeface="Hanken Grotesk" pitchFamily="2" charset="77"/>
+              </a:rPr>
+              <a:t>i</a:t>
+            </a:r>
+            <a:r>
+              <a:rPr lang="en-US" dirty="0">
+                <a:solidFill>
+                  <a:srgbClr val="000000"/>
+                </a:solidFill>
+                <a:effectLst/>
+                <a:latin typeface="Hanken Grotesk" pitchFamily="2" charset="77"/>
+              </a:rPr>
+              <a:t> </a:t>
+            </a:r>
+            <a:r>
+              <a:rPr lang="en-US" b="1" dirty="0" err="1">
+                <a:solidFill>
+                  <a:srgbClr val="000000"/>
+                </a:solidFill>
+                <a:effectLst/>
+                <a:latin typeface="Hanken Grotesk" pitchFamily="2" charset="77"/>
+              </a:rPr>
+              <a:t>umożliwia</a:t>
+            </a:r>
+            <a:r>
+              <a:rPr lang="en-US" b="1" dirty="0">
+                <a:solidFill>
+                  <a:srgbClr val="000000"/>
+                </a:solidFill>
+                <a:effectLst/>
+                <a:latin typeface="Hanken Grotesk" pitchFamily="2" charset="77"/>
+              </a:rPr>
+              <a:t> </a:t>
+            </a:r>
+            <a:r>
+              <a:rPr lang="en-US" b="1" dirty="0" err="1">
+                <a:solidFill>
+                  <a:srgbClr val="000000"/>
+                </a:solidFill>
+                <a:effectLst/>
+                <a:latin typeface="Hanken Grotesk" pitchFamily="2" charset="77"/>
+              </a:rPr>
+              <a:t>powtórki</a:t>
+            </a:r>
+            <a:r>
+              <a:rPr lang="en-US" b="1" dirty="0">
+                <a:solidFill>
+                  <a:srgbClr val="000000"/>
+                </a:solidFill>
+                <a:effectLst/>
+                <a:latin typeface="Hanken Grotesk" pitchFamily="2" charset="77"/>
+              </a:rPr>
+              <a:t> </a:t>
+            </a:r>
+            <a:r>
+              <a:rPr lang="en-US" b="1" dirty="0" err="1">
+                <a:solidFill>
+                  <a:srgbClr val="000000"/>
+                </a:solidFill>
+                <a:effectLst/>
+                <a:latin typeface="Hanken Grotesk" pitchFamily="2" charset="77"/>
+              </a:rPr>
+              <a:t>słów</a:t>
+            </a:r>
+            <a:r>
+              <a:rPr lang="en-US" dirty="0">
+                <a:solidFill>
+                  <a:srgbClr val="000000"/>
+                </a:solidFill>
+                <a:effectLst/>
+                <a:latin typeface="Hanken Grotesk" pitchFamily="2" charset="77"/>
+              </a:rPr>
+              <a:t>, </a:t>
+            </a:r>
+            <a:r>
+              <a:rPr lang="en-US" dirty="0" err="1">
+                <a:solidFill>
+                  <a:srgbClr val="000000"/>
+                </a:solidFill>
+                <a:effectLst/>
+                <a:latin typeface="Hanken Grotesk" pitchFamily="2" charset="77"/>
+              </a:rPr>
+              <a:t>które</a:t>
+            </a:r>
+            <a:r>
+              <a:rPr lang="en-US" dirty="0">
+                <a:solidFill>
+                  <a:srgbClr val="000000"/>
+                </a:solidFill>
+                <a:effectLst/>
+                <a:latin typeface="Hanken Grotesk" pitchFamily="2" charset="77"/>
+              </a:rPr>
+              <a:t> </a:t>
+            </a:r>
+            <a:r>
+              <a:rPr lang="en-US" dirty="0" err="1">
+                <a:solidFill>
+                  <a:srgbClr val="000000"/>
+                </a:solidFill>
+                <a:effectLst/>
+                <a:latin typeface="Hanken Grotesk" pitchFamily="2" charset="77"/>
+              </a:rPr>
+              <a:t>sprawiały</a:t>
+            </a:r>
+            <a:r>
+              <a:rPr lang="en-US" dirty="0">
+                <a:solidFill>
+                  <a:srgbClr val="000000"/>
+                </a:solidFill>
+                <a:effectLst/>
+                <a:latin typeface="Hanken Grotesk" pitchFamily="2" charset="77"/>
+              </a:rPr>
+              <a:t> </a:t>
+            </a:r>
+            <a:r>
+              <a:rPr lang="en-US" dirty="0" err="1">
+                <a:solidFill>
+                  <a:srgbClr val="000000"/>
+                </a:solidFill>
+                <a:effectLst/>
+                <a:latin typeface="Hanken Grotesk" pitchFamily="2" charset="77"/>
+              </a:rPr>
+              <a:t>trudność</a:t>
+            </a:r>
+            <a:r>
+              <a:rPr lang="en-US" dirty="0">
+                <a:solidFill>
+                  <a:srgbClr val="000000"/>
+                </a:solidFill>
+                <a:effectLst/>
+                <a:latin typeface="Hanken Grotesk" pitchFamily="2" charset="77"/>
+              </a:rPr>
+              <a:t>.</a:t>
+            </a:r>
+            <a:br>
+              <a:rPr lang="en-US" dirty="0">
+                <a:solidFill>
+                  <a:srgbClr val="000000"/>
+                </a:solidFill>
+                <a:effectLst/>
+                <a:latin typeface="Hanken Grotesk" pitchFamily="2" charset="77"/>
+              </a:rPr>
+            </a:br>
+            <a:endParaRPr lang="en-US" dirty="0">
+              <a:solidFill>
+                <a:srgbClr val="000000"/>
+              </a:solidFill>
+              <a:effectLst/>
+              <a:latin typeface="Hanken Grotesk" pitchFamily="2" charset="77"/>
+            </a:endParaRPr>
+          </a:p>
+          <a:p>
+            <a:r>
+              <a:rPr lang="en-US" dirty="0" err="1">
+                <a:solidFill>
+                  <a:srgbClr val="000000"/>
+                </a:solidFill>
+                <a:effectLst/>
+                <a:latin typeface="Hanken Grotesk" pitchFamily="2" charset="77"/>
+              </a:rPr>
+              <a:t>Użytkownik</a:t>
+            </a:r>
+            <a:r>
+              <a:rPr lang="en-US" dirty="0">
+                <a:solidFill>
+                  <a:srgbClr val="000000"/>
+                </a:solidFill>
+                <a:effectLst/>
+                <a:latin typeface="Hanken Grotesk" pitchFamily="2" charset="77"/>
+              </a:rPr>
+              <a:t> ma </a:t>
+            </a:r>
+            <a:r>
+              <a:rPr lang="en-US" b="1" dirty="0" err="1">
+                <a:solidFill>
+                  <a:srgbClr val="000000"/>
+                </a:solidFill>
+                <a:effectLst/>
+                <a:latin typeface="Hanken Grotesk" pitchFamily="2" charset="77"/>
+              </a:rPr>
+              <a:t>możliwość</a:t>
+            </a:r>
+            <a:r>
+              <a:rPr lang="en-US" b="1" dirty="0">
+                <a:solidFill>
+                  <a:srgbClr val="000000"/>
+                </a:solidFill>
+                <a:effectLst/>
+                <a:latin typeface="Hanken Grotesk" pitchFamily="2" charset="77"/>
+              </a:rPr>
+              <a:t> </a:t>
+            </a:r>
+            <a:r>
+              <a:rPr lang="en-US" b="1" dirty="0" err="1">
+                <a:solidFill>
+                  <a:srgbClr val="000000"/>
+                </a:solidFill>
+                <a:effectLst/>
+                <a:latin typeface="Hanken Grotesk" pitchFamily="2" charset="77"/>
+              </a:rPr>
+              <a:t>logowania</a:t>
+            </a:r>
+            <a:r>
+              <a:rPr lang="en-US" b="1" dirty="0">
+                <a:solidFill>
+                  <a:srgbClr val="000000"/>
+                </a:solidFill>
+                <a:effectLst/>
+                <a:latin typeface="Hanken Grotesk" pitchFamily="2" charset="77"/>
+              </a:rPr>
+              <a:t> </a:t>
+            </a:r>
+            <a:r>
+              <a:rPr lang="en-US" b="1" dirty="0" err="1">
+                <a:solidFill>
+                  <a:srgbClr val="000000"/>
+                </a:solidFill>
+                <a:effectLst/>
+                <a:latin typeface="Hanken Grotesk" pitchFamily="2" charset="77"/>
+              </a:rPr>
+              <a:t>się</a:t>
+            </a:r>
+            <a:r>
+              <a:rPr lang="en-US" b="1" dirty="0">
+                <a:solidFill>
+                  <a:srgbClr val="000000"/>
+                </a:solidFill>
+                <a:effectLst/>
+                <a:latin typeface="Hanken Grotesk" pitchFamily="2" charset="77"/>
+              </a:rPr>
+              <a:t> </a:t>
+            </a:r>
+            <a:r>
+              <a:rPr lang="en-US" dirty="0">
+                <a:solidFill>
+                  <a:srgbClr val="000000"/>
+                </a:solidFill>
+                <a:effectLst/>
+                <a:latin typeface="Hanken Grotesk" pitchFamily="2" charset="77"/>
+              </a:rPr>
+              <a:t>do </a:t>
+            </a:r>
+            <a:r>
+              <a:rPr lang="en-US" dirty="0" err="1">
+                <a:solidFill>
+                  <a:srgbClr val="000000"/>
+                </a:solidFill>
+                <a:effectLst/>
+                <a:latin typeface="Hanken Grotesk" pitchFamily="2" charset="77"/>
+              </a:rPr>
+              <a:t>aplikacji</a:t>
+            </a:r>
+            <a:r>
+              <a:rPr lang="en-US" dirty="0">
+                <a:solidFill>
+                  <a:srgbClr val="000000"/>
+                </a:solidFill>
+                <a:effectLst/>
+                <a:latin typeface="Hanken Grotesk" pitchFamily="2" charset="77"/>
+              </a:rPr>
+              <a:t>, co </a:t>
+            </a:r>
+            <a:r>
+              <a:rPr lang="en-US" dirty="0" err="1">
+                <a:solidFill>
+                  <a:srgbClr val="000000"/>
+                </a:solidFill>
+                <a:effectLst/>
+                <a:latin typeface="Hanken Grotesk" pitchFamily="2" charset="77"/>
+              </a:rPr>
+              <a:t>pozwala</a:t>
+            </a:r>
+            <a:r>
+              <a:rPr lang="en-US" dirty="0">
+                <a:solidFill>
+                  <a:srgbClr val="000000"/>
+                </a:solidFill>
+                <a:effectLst/>
+                <a:latin typeface="Hanken Grotesk" pitchFamily="2" charset="77"/>
+              </a:rPr>
+              <a:t> </a:t>
+            </a:r>
+            <a:r>
+              <a:rPr lang="en-US" dirty="0" err="1">
+                <a:solidFill>
+                  <a:srgbClr val="000000"/>
+                </a:solidFill>
+                <a:effectLst/>
+                <a:latin typeface="Hanken Grotesk" pitchFamily="2" charset="77"/>
+              </a:rPr>
+              <a:t>na</a:t>
+            </a:r>
+            <a:r>
+              <a:rPr lang="en-US" dirty="0">
+                <a:solidFill>
+                  <a:srgbClr val="000000"/>
+                </a:solidFill>
+                <a:effectLst/>
+                <a:latin typeface="Hanken Grotesk" pitchFamily="2" charset="77"/>
+              </a:rPr>
+              <a:t> </a:t>
+            </a:r>
+            <a:r>
+              <a:rPr lang="en-US" b="1" dirty="0" err="1">
+                <a:solidFill>
+                  <a:srgbClr val="000000"/>
+                </a:solidFill>
+                <a:effectLst/>
+                <a:latin typeface="Hanken Grotesk" pitchFamily="2" charset="77"/>
+              </a:rPr>
+              <a:t>personalizację</a:t>
+            </a:r>
+            <a:r>
+              <a:rPr lang="en-US" b="1" dirty="0">
+                <a:solidFill>
+                  <a:srgbClr val="000000"/>
+                </a:solidFill>
+                <a:effectLst/>
+                <a:latin typeface="Hanken Grotesk" pitchFamily="2" charset="77"/>
+              </a:rPr>
+              <a:t> </a:t>
+            </a:r>
+            <a:r>
+              <a:rPr lang="en-US" b="1" dirty="0" err="1">
+                <a:solidFill>
+                  <a:srgbClr val="000000"/>
+                </a:solidFill>
+                <a:effectLst/>
+                <a:latin typeface="Hanken Grotesk" pitchFamily="2" charset="77"/>
+              </a:rPr>
+              <a:t>zestawów</a:t>
+            </a:r>
+            <a:r>
+              <a:rPr lang="en-US" b="1" dirty="0">
+                <a:solidFill>
+                  <a:srgbClr val="000000"/>
+                </a:solidFill>
+                <a:effectLst/>
+                <a:latin typeface="Hanken Grotesk" pitchFamily="2" charset="77"/>
+              </a:rPr>
+              <a:t> </a:t>
+            </a:r>
+            <a:r>
+              <a:rPr lang="en-US" b="1" dirty="0" err="1">
+                <a:solidFill>
+                  <a:srgbClr val="000000"/>
+                </a:solidFill>
+                <a:effectLst/>
+                <a:latin typeface="Hanken Grotesk" pitchFamily="2" charset="77"/>
+              </a:rPr>
+              <a:t>słówek</a:t>
+            </a:r>
+            <a:r>
+              <a:rPr lang="en-US" dirty="0">
+                <a:solidFill>
+                  <a:srgbClr val="000000"/>
+                </a:solidFill>
+                <a:effectLst/>
+                <a:latin typeface="Hanken Grotesk" pitchFamily="2" charset="77"/>
+              </a:rPr>
+              <a:t> </a:t>
+            </a:r>
+            <a:r>
+              <a:rPr lang="en-US" dirty="0" err="1">
+                <a:solidFill>
+                  <a:srgbClr val="000000"/>
+                </a:solidFill>
+                <a:effectLst/>
+                <a:latin typeface="Hanken Grotesk" pitchFamily="2" charset="77"/>
+              </a:rPr>
+              <a:t>i</a:t>
+            </a:r>
+            <a:r>
+              <a:rPr lang="en-US" dirty="0">
+                <a:solidFill>
+                  <a:srgbClr val="000000"/>
+                </a:solidFill>
+                <a:effectLst/>
+                <a:latin typeface="Hanken Grotesk" pitchFamily="2" charset="77"/>
+              </a:rPr>
+              <a:t> </a:t>
+            </a:r>
+            <a:r>
+              <a:rPr lang="en-US" b="1" dirty="0" err="1">
+                <a:solidFill>
+                  <a:srgbClr val="000000"/>
+                </a:solidFill>
+                <a:effectLst/>
+                <a:latin typeface="Hanken Grotesk" pitchFamily="2" charset="77"/>
+              </a:rPr>
+              <a:t>śledzenie</a:t>
+            </a:r>
+            <a:r>
+              <a:rPr lang="en-US" b="1" dirty="0">
+                <a:solidFill>
+                  <a:srgbClr val="000000"/>
+                </a:solidFill>
+                <a:effectLst/>
+                <a:latin typeface="Hanken Grotesk" pitchFamily="2" charset="77"/>
+              </a:rPr>
+              <a:t> </a:t>
+            </a:r>
+            <a:r>
+              <a:rPr lang="en-US" b="1" dirty="0" err="1">
+                <a:solidFill>
+                  <a:srgbClr val="000000"/>
+                </a:solidFill>
+                <a:effectLst/>
+                <a:latin typeface="Hanken Grotesk" pitchFamily="2" charset="77"/>
+              </a:rPr>
+              <a:t>postępów</a:t>
+            </a:r>
+            <a:r>
+              <a:rPr lang="en-US" dirty="0">
+                <a:solidFill>
+                  <a:srgbClr val="000000"/>
+                </a:solidFill>
+                <a:effectLst/>
+                <a:latin typeface="Hanken Grotesk" pitchFamily="2" charset="77"/>
+              </a:rPr>
+              <a:t>. </a:t>
+            </a:r>
+            <a:r>
+              <a:rPr lang="en-US" dirty="0" err="1">
+                <a:solidFill>
+                  <a:srgbClr val="000000"/>
+                </a:solidFill>
+                <a:effectLst/>
+                <a:latin typeface="Hanken Grotesk" pitchFamily="2" charset="77"/>
+              </a:rPr>
+              <a:t>Aplikacja</a:t>
+            </a:r>
+            <a:r>
+              <a:rPr lang="en-US" dirty="0">
+                <a:solidFill>
+                  <a:srgbClr val="000000"/>
+                </a:solidFill>
+                <a:effectLst/>
+                <a:latin typeface="Hanken Grotesk" pitchFamily="2" charset="77"/>
+              </a:rPr>
+              <a:t> </a:t>
+            </a:r>
+            <a:r>
+              <a:rPr lang="en-US" dirty="0" err="1">
+                <a:solidFill>
+                  <a:srgbClr val="000000"/>
+                </a:solidFill>
+                <a:effectLst/>
+                <a:latin typeface="Hanken Grotesk" pitchFamily="2" charset="77"/>
+              </a:rPr>
+              <a:t>umożliwia</a:t>
+            </a:r>
+            <a:r>
+              <a:rPr lang="en-US" dirty="0">
+                <a:solidFill>
+                  <a:srgbClr val="000000"/>
+                </a:solidFill>
+                <a:effectLst/>
+                <a:latin typeface="Hanken Grotesk" pitchFamily="2" charset="77"/>
+              </a:rPr>
+              <a:t> </a:t>
+            </a:r>
+            <a:r>
+              <a:rPr lang="en-US" dirty="0" err="1">
+                <a:solidFill>
+                  <a:srgbClr val="000000"/>
+                </a:solidFill>
+                <a:effectLst/>
+                <a:latin typeface="Hanken Grotesk" pitchFamily="2" charset="77"/>
+              </a:rPr>
+              <a:t>także</a:t>
+            </a:r>
+            <a:r>
+              <a:rPr lang="en-US" dirty="0">
+                <a:solidFill>
+                  <a:srgbClr val="000000"/>
+                </a:solidFill>
+                <a:effectLst/>
+                <a:latin typeface="Hanken Grotesk" pitchFamily="2" charset="77"/>
+              </a:rPr>
+              <a:t> </a:t>
+            </a:r>
+            <a:r>
+              <a:rPr lang="en-US" b="1" dirty="0" err="1">
+                <a:solidFill>
+                  <a:srgbClr val="000000"/>
+                </a:solidFill>
+                <a:effectLst/>
+                <a:latin typeface="Hanken Grotesk" pitchFamily="2" charset="77"/>
+              </a:rPr>
+              <a:t>wybór</a:t>
+            </a:r>
+            <a:r>
+              <a:rPr lang="en-US" b="1" dirty="0">
+                <a:solidFill>
+                  <a:srgbClr val="000000"/>
+                </a:solidFill>
+                <a:effectLst/>
+                <a:latin typeface="Hanken Grotesk" pitchFamily="2" charset="77"/>
+              </a:rPr>
+              <a:t> </a:t>
+            </a:r>
+            <a:r>
+              <a:rPr lang="en-US" b="1" dirty="0" err="1">
+                <a:solidFill>
+                  <a:srgbClr val="000000"/>
+                </a:solidFill>
+                <a:effectLst/>
+                <a:latin typeface="Hanken Grotesk" pitchFamily="2" charset="77"/>
+              </a:rPr>
+              <a:t>języka</a:t>
+            </a:r>
+            <a:r>
+              <a:rPr lang="en-US" dirty="0">
+                <a:solidFill>
+                  <a:srgbClr val="000000"/>
+                </a:solidFill>
+                <a:effectLst/>
+                <a:latin typeface="Hanken Grotesk" pitchFamily="2" charset="77"/>
+              </a:rPr>
+              <a:t>, co </a:t>
+            </a:r>
+            <a:r>
+              <a:rPr lang="en-US" dirty="0" err="1">
+                <a:solidFill>
+                  <a:srgbClr val="000000"/>
+                </a:solidFill>
+                <a:effectLst/>
+                <a:latin typeface="Hanken Grotesk" pitchFamily="2" charset="77"/>
+              </a:rPr>
+              <a:t>pozwala</a:t>
+            </a:r>
+            <a:r>
+              <a:rPr lang="en-US" dirty="0">
+                <a:solidFill>
+                  <a:srgbClr val="000000"/>
+                </a:solidFill>
+                <a:effectLst/>
+                <a:latin typeface="Hanken Grotesk" pitchFamily="2" charset="77"/>
+              </a:rPr>
+              <a:t> </a:t>
+            </a:r>
+            <a:r>
+              <a:rPr lang="en-US" dirty="0" err="1">
+                <a:solidFill>
+                  <a:srgbClr val="000000"/>
+                </a:solidFill>
+                <a:effectLst/>
+                <a:latin typeface="Hanken Grotesk" pitchFamily="2" charset="77"/>
+              </a:rPr>
+              <a:t>dostosować</a:t>
+            </a:r>
+            <a:r>
+              <a:rPr lang="en-US" dirty="0">
+                <a:solidFill>
+                  <a:srgbClr val="000000"/>
+                </a:solidFill>
+                <a:effectLst/>
+                <a:latin typeface="Hanken Grotesk" pitchFamily="2" charset="77"/>
+              </a:rPr>
+              <a:t> </a:t>
+            </a:r>
+            <a:r>
+              <a:rPr lang="en-US" dirty="0" err="1">
+                <a:solidFill>
+                  <a:srgbClr val="000000"/>
+                </a:solidFill>
+                <a:effectLst/>
+                <a:latin typeface="Hanken Grotesk" pitchFamily="2" charset="77"/>
+              </a:rPr>
+              <a:t>doświadczenie</a:t>
+            </a:r>
+            <a:r>
+              <a:rPr lang="en-US" dirty="0">
+                <a:solidFill>
+                  <a:srgbClr val="000000"/>
+                </a:solidFill>
+                <a:effectLst/>
+                <a:latin typeface="Hanken Grotesk" pitchFamily="2" charset="77"/>
+              </a:rPr>
+              <a:t> do </a:t>
+            </a:r>
+            <a:r>
+              <a:rPr lang="en-US" dirty="0" err="1">
+                <a:solidFill>
+                  <a:srgbClr val="000000"/>
+                </a:solidFill>
+                <a:effectLst/>
+                <a:latin typeface="Hanken Grotesk" pitchFamily="2" charset="77"/>
+              </a:rPr>
+              <a:t>preferencji</a:t>
+            </a:r>
+            <a:r>
+              <a:rPr lang="en-US" dirty="0">
+                <a:solidFill>
+                  <a:srgbClr val="000000"/>
+                </a:solidFill>
+                <a:effectLst/>
+                <a:latin typeface="Hanken Grotesk" pitchFamily="2" charset="77"/>
+              </a:rPr>
+              <a:t> </a:t>
+            </a:r>
+            <a:r>
+              <a:rPr lang="en-US" dirty="0" err="1">
+                <a:solidFill>
+                  <a:srgbClr val="000000"/>
+                </a:solidFill>
+                <a:effectLst/>
+                <a:latin typeface="Hanken Grotesk" pitchFamily="2" charset="77"/>
+              </a:rPr>
+              <a:t>użytkownika</a:t>
+            </a:r>
+            <a:r>
+              <a:rPr lang="en-US" dirty="0">
+                <a:solidFill>
+                  <a:srgbClr val="000000"/>
+                </a:solidFill>
+                <a:effectLst/>
+                <a:latin typeface="Hanken Grotesk" pitchFamily="2" charset="77"/>
+              </a:rPr>
+              <a:t>.</a:t>
+            </a:r>
+            <a:br>
+              <a:rPr lang="en-US" dirty="0">
+                <a:solidFill>
+                  <a:srgbClr val="000000"/>
+                </a:solidFill>
+                <a:effectLst/>
+                <a:latin typeface="Hanken Grotesk" pitchFamily="2" charset="77"/>
+              </a:rPr>
+            </a:br>
+            <a:endParaRPr lang="en-US" dirty="0">
+              <a:solidFill>
+                <a:srgbClr val="000000"/>
+              </a:solidFill>
+              <a:effectLst/>
+              <a:latin typeface="Hanken Grotesk" pitchFamily="2" charset="77"/>
+            </a:endParaRPr>
+          </a:p>
+          <a:p>
+            <a:r>
+              <a:rPr lang="en-US" dirty="0" err="1">
+                <a:solidFill>
+                  <a:srgbClr val="000000"/>
+                </a:solidFill>
+                <a:effectLst/>
+                <a:latin typeface="Hanken Grotesk" pitchFamily="2" charset="77"/>
+              </a:rPr>
+              <a:t>Dodatkowo</a:t>
+            </a:r>
+            <a:r>
+              <a:rPr lang="en-US" dirty="0">
+                <a:solidFill>
+                  <a:srgbClr val="000000"/>
+                </a:solidFill>
+                <a:effectLst/>
+                <a:latin typeface="Hanken Grotesk" pitchFamily="2" charset="77"/>
+              </a:rPr>
+              <a:t> </a:t>
+            </a:r>
+            <a:r>
+              <a:rPr lang="en-US" dirty="0" err="1">
+                <a:solidFill>
+                  <a:srgbClr val="000000"/>
+                </a:solidFill>
+                <a:effectLst/>
+                <a:latin typeface="Hanken Grotesk" pitchFamily="2" charset="77"/>
+              </a:rPr>
+              <a:t>aplikacja</a:t>
+            </a:r>
+            <a:r>
+              <a:rPr lang="en-US" dirty="0">
+                <a:solidFill>
+                  <a:srgbClr val="000000"/>
+                </a:solidFill>
+                <a:effectLst/>
+                <a:latin typeface="Hanken Grotesk" pitchFamily="2" charset="77"/>
+              </a:rPr>
+              <a:t> </a:t>
+            </a:r>
+            <a:r>
+              <a:rPr lang="en-US" dirty="0" err="1">
+                <a:solidFill>
+                  <a:srgbClr val="000000"/>
+                </a:solidFill>
+                <a:effectLst/>
+                <a:latin typeface="Hanken Grotesk" pitchFamily="2" charset="77"/>
+              </a:rPr>
+              <a:t>oferuje</a:t>
+            </a:r>
+            <a:r>
+              <a:rPr lang="en-US" dirty="0">
+                <a:solidFill>
+                  <a:srgbClr val="000000"/>
+                </a:solidFill>
+                <a:effectLst/>
+                <a:latin typeface="Hanken Grotesk" pitchFamily="2" charset="77"/>
+              </a:rPr>
+              <a:t> </a:t>
+            </a:r>
+            <a:r>
+              <a:rPr lang="en-US" b="1" dirty="0" err="1">
+                <a:solidFill>
+                  <a:srgbClr val="000000"/>
+                </a:solidFill>
+                <a:effectLst/>
+                <a:latin typeface="Hanken Grotesk" pitchFamily="2" charset="77"/>
+              </a:rPr>
+              <a:t>funkcje</a:t>
+            </a:r>
+            <a:r>
+              <a:rPr lang="en-US" dirty="0">
+                <a:solidFill>
+                  <a:srgbClr val="000000"/>
+                </a:solidFill>
+                <a:effectLst/>
+                <a:latin typeface="Hanken Grotesk" pitchFamily="2" charset="77"/>
+              </a:rPr>
+              <a:t> </a:t>
+            </a:r>
+            <a:r>
+              <a:rPr lang="en-US" b="1" dirty="0" err="1">
+                <a:solidFill>
+                  <a:srgbClr val="000000"/>
+                </a:solidFill>
+                <a:effectLst/>
+                <a:latin typeface="Hanken Grotesk" pitchFamily="2" charset="77"/>
+              </a:rPr>
+              <a:t>grupowania</a:t>
+            </a:r>
+            <a:r>
+              <a:rPr lang="en-US" b="1" dirty="0">
+                <a:solidFill>
+                  <a:srgbClr val="000000"/>
+                </a:solidFill>
+                <a:effectLst/>
+                <a:latin typeface="Hanken Grotesk" pitchFamily="2" charset="77"/>
+              </a:rPr>
+              <a:t> </a:t>
+            </a:r>
+            <a:r>
+              <a:rPr lang="en-US" b="1" dirty="0" err="1">
+                <a:solidFill>
+                  <a:srgbClr val="000000"/>
+                </a:solidFill>
+                <a:effectLst/>
+                <a:latin typeface="Hanken Grotesk" pitchFamily="2" charset="77"/>
+              </a:rPr>
+              <a:t>słów</a:t>
+            </a:r>
+            <a:r>
+              <a:rPr lang="en-US" b="1" dirty="0">
+                <a:solidFill>
+                  <a:srgbClr val="000000"/>
+                </a:solidFill>
+                <a:effectLst/>
+                <a:latin typeface="Hanken Grotesk" pitchFamily="2" charset="77"/>
+              </a:rPr>
+              <a:t> w </a:t>
+            </a:r>
+            <a:r>
+              <a:rPr lang="en-US" b="1" dirty="0" err="1">
+                <a:solidFill>
+                  <a:srgbClr val="000000"/>
+                </a:solidFill>
+                <a:effectLst/>
+                <a:latin typeface="Hanken Grotesk" pitchFamily="2" charset="77"/>
+              </a:rPr>
+              <a:t>kategorie</a:t>
+            </a:r>
+            <a:r>
+              <a:rPr lang="en-US" b="1" dirty="0">
+                <a:solidFill>
+                  <a:srgbClr val="000000"/>
+                </a:solidFill>
+                <a:effectLst/>
+                <a:latin typeface="Hanken Grotesk" pitchFamily="2" charset="77"/>
+              </a:rPr>
+              <a:t> </a:t>
+            </a:r>
+            <a:r>
+              <a:rPr lang="en-US" dirty="0">
+                <a:solidFill>
+                  <a:srgbClr val="000000"/>
+                </a:solidFill>
+                <a:effectLst/>
+                <a:latin typeface="Hanken Grotesk" pitchFamily="2" charset="77"/>
+              </a:rPr>
+              <a:t>(np. „</a:t>
+            </a:r>
+            <a:r>
+              <a:rPr lang="en-US" dirty="0" err="1">
+                <a:solidFill>
+                  <a:srgbClr val="000000"/>
+                </a:solidFill>
+                <a:effectLst/>
+                <a:latin typeface="Hanken Grotesk" pitchFamily="2" charset="77"/>
+              </a:rPr>
+              <a:t>Podróże</a:t>
+            </a:r>
+            <a:r>
+              <a:rPr lang="en-US" dirty="0">
+                <a:solidFill>
+                  <a:srgbClr val="000000"/>
+                </a:solidFill>
+                <a:effectLst/>
+                <a:latin typeface="Hanken Grotesk" pitchFamily="2" charset="77"/>
+              </a:rPr>
+              <a:t>”, „</a:t>
+            </a:r>
+            <a:r>
+              <a:rPr lang="en-US" dirty="0" err="1">
+                <a:solidFill>
+                  <a:srgbClr val="000000"/>
+                </a:solidFill>
+                <a:effectLst/>
+                <a:latin typeface="Hanken Grotesk" pitchFamily="2" charset="77"/>
+              </a:rPr>
+              <a:t>Zakupy</a:t>
+            </a:r>
+            <a:r>
+              <a:rPr lang="en-US" dirty="0">
+                <a:solidFill>
+                  <a:srgbClr val="000000"/>
+                </a:solidFill>
+                <a:effectLst/>
+                <a:latin typeface="Hanken Grotesk" pitchFamily="2" charset="77"/>
+              </a:rPr>
+              <a:t>”), a </a:t>
+            </a:r>
+            <a:r>
+              <a:rPr lang="en-US" dirty="0" err="1">
+                <a:solidFill>
+                  <a:srgbClr val="000000"/>
+                </a:solidFill>
+                <a:effectLst/>
+                <a:latin typeface="Hanken Grotesk" pitchFamily="2" charset="77"/>
+              </a:rPr>
+              <a:t>także</a:t>
+            </a:r>
+            <a:r>
+              <a:rPr lang="en-US" dirty="0">
+                <a:solidFill>
+                  <a:srgbClr val="000000"/>
+                </a:solidFill>
+                <a:effectLst/>
+                <a:latin typeface="Hanken Grotesk" pitchFamily="2" charset="77"/>
+              </a:rPr>
+              <a:t> </a:t>
+            </a:r>
+            <a:r>
+              <a:rPr lang="en-US" b="1" dirty="0" err="1">
+                <a:solidFill>
+                  <a:srgbClr val="000000"/>
+                </a:solidFill>
+                <a:effectLst/>
+                <a:latin typeface="Hanken Grotesk" pitchFamily="2" charset="77"/>
+              </a:rPr>
+              <a:t>eksportu</a:t>
+            </a:r>
+            <a:r>
+              <a:rPr lang="en-US" b="1" dirty="0">
+                <a:solidFill>
+                  <a:srgbClr val="000000"/>
+                </a:solidFill>
+                <a:effectLst/>
+                <a:latin typeface="Hanken Grotesk" pitchFamily="2" charset="77"/>
+              </a:rPr>
+              <a:t> </a:t>
+            </a:r>
+            <a:r>
+              <a:rPr lang="en-US" b="1" dirty="0" err="1">
+                <a:solidFill>
+                  <a:srgbClr val="000000"/>
+                </a:solidFill>
+                <a:effectLst/>
+                <a:latin typeface="Hanken Grotesk" pitchFamily="2" charset="77"/>
+              </a:rPr>
+              <a:t>i</a:t>
+            </a:r>
+            <a:r>
+              <a:rPr lang="en-US" b="1" dirty="0">
+                <a:solidFill>
+                  <a:srgbClr val="000000"/>
+                </a:solidFill>
+                <a:effectLst/>
+                <a:latin typeface="Hanken Grotesk" pitchFamily="2" charset="77"/>
+              </a:rPr>
+              <a:t> </a:t>
+            </a:r>
+            <a:r>
+              <a:rPr lang="en-US" b="1" dirty="0" err="1">
+                <a:solidFill>
+                  <a:srgbClr val="000000"/>
+                </a:solidFill>
+                <a:effectLst/>
+                <a:latin typeface="Hanken Grotesk" pitchFamily="2" charset="77"/>
+              </a:rPr>
+              <a:t>importu</a:t>
+            </a:r>
+            <a:r>
+              <a:rPr lang="en-US" b="1" dirty="0">
+                <a:solidFill>
+                  <a:srgbClr val="000000"/>
+                </a:solidFill>
+                <a:effectLst/>
+                <a:latin typeface="Hanken Grotesk" pitchFamily="2" charset="77"/>
+              </a:rPr>
+              <a:t> </a:t>
+            </a:r>
+            <a:r>
+              <a:rPr lang="en-US" b="1" dirty="0" err="1">
+                <a:solidFill>
+                  <a:srgbClr val="000000"/>
+                </a:solidFill>
+                <a:effectLst/>
+                <a:latin typeface="Hanken Grotesk" pitchFamily="2" charset="77"/>
+              </a:rPr>
+              <a:t>danych</a:t>
+            </a:r>
+            <a:r>
+              <a:rPr lang="en-US" dirty="0">
+                <a:solidFill>
+                  <a:srgbClr val="000000"/>
+                </a:solidFill>
+                <a:effectLst/>
+                <a:latin typeface="Hanken Grotesk" pitchFamily="2" charset="77"/>
+              </a:rPr>
+              <a:t>. </a:t>
+            </a:r>
+            <a:r>
+              <a:rPr lang="en-US" dirty="0" err="1">
+                <a:solidFill>
+                  <a:srgbClr val="000000"/>
+                </a:solidFill>
+                <a:effectLst/>
+                <a:latin typeface="Hanken Grotesk" pitchFamily="2" charset="77"/>
+              </a:rPr>
+              <a:t>Dzięki</a:t>
+            </a:r>
+            <a:r>
+              <a:rPr lang="en-US" dirty="0">
+                <a:solidFill>
+                  <a:srgbClr val="000000"/>
+                </a:solidFill>
+                <a:effectLst/>
+                <a:latin typeface="Hanken Grotesk" pitchFamily="2" charset="77"/>
+              </a:rPr>
+              <a:t> </a:t>
+            </a:r>
+            <a:r>
+              <a:rPr lang="en-US" dirty="0" err="1">
+                <a:solidFill>
+                  <a:srgbClr val="000000"/>
+                </a:solidFill>
+                <a:effectLst/>
+                <a:latin typeface="Hanken Grotesk" pitchFamily="2" charset="77"/>
+              </a:rPr>
+              <a:t>temu</a:t>
+            </a:r>
+            <a:r>
+              <a:rPr lang="en-US" dirty="0">
+                <a:solidFill>
+                  <a:srgbClr val="000000"/>
+                </a:solidFill>
+                <a:effectLst/>
+                <a:latin typeface="Hanken Grotesk" pitchFamily="2" charset="77"/>
+              </a:rPr>
+              <a:t> </a:t>
+            </a:r>
+            <a:r>
+              <a:rPr lang="en-US" dirty="0" err="1">
+                <a:solidFill>
+                  <a:srgbClr val="000000"/>
+                </a:solidFill>
+                <a:effectLst/>
+                <a:latin typeface="Hanken Grotesk" pitchFamily="2" charset="77"/>
+              </a:rPr>
+              <a:t>użytkownik</a:t>
+            </a:r>
+            <a:r>
+              <a:rPr lang="en-US" dirty="0">
+                <a:solidFill>
+                  <a:srgbClr val="000000"/>
+                </a:solidFill>
+                <a:effectLst/>
+                <a:latin typeface="Hanken Grotesk" pitchFamily="2" charset="77"/>
+              </a:rPr>
+              <a:t> </a:t>
+            </a:r>
+            <a:r>
+              <a:rPr lang="en-US" dirty="0" err="1">
+                <a:solidFill>
+                  <a:srgbClr val="000000"/>
+                </a:solidFill>
+                <a:effectLst/>
+                <a:latin typeface="Hanken Grotesk" pitchFamily="2" charset="77"/>
+              </a:rPr>
+              <a:t>może</a:t>
+            </a:r>
+            <a:r>
+              <a:rPr lang="en-US" dirty="0">
+                <a:solidFill>
+                  <a:srgbClr val="000000"/>
+                </a:solidFill>
+                <a:effectLst/>
+                <a:latin typeface="Hanken Grotesk" pitchFamily="2" charset="77"/>
+              </a:rPr>
+              <a:t> </a:t>
+            </a:r>
+            <a:r>
+              <a:rPr lang="en-US" b="1" dirty="0" err="1">
+                <a:solidFill>
+                  <a:srgbClr val="000000"/>
+                </a:solidFill>
+                <a:effectLst/>
+                <a:latin typeface="Hanken Grotesk" pitchFamily="2" charset="77"/>
+              </a:rPr>
+              <a:t>generować</a:t>
+            </a:r>
+            <a:r>
+              <a:rPr lang="en-US" b="1" dirty="0">
+                <a:solidFill>
+                  <a:srgbClr val="000000"/>
+                </a:solidFill>
+                <a:effectLst/>
+                <a:latin typeface="Hanken Grotesk" pitchFamily="2" charset="77"/>
+              </a:rPr>
+              <a:t> </a:t>
+            </a:r>
+            <a:r>
+              <a:rPr lang="en-US" b="1" dirty="0" err="1">
+                <a:solidFill>
+                  <a:srgbClr val="000000"/>
+                </a:solidFill>
+                <a:effectLst/>
+                <a:latin typeface="Hanken Grotesk" pitchFamily="2" charset="77"/>
+              </a:rPr>
+              <a:t>raporty</a:t>
+            </a:r>
+            <a:r>
+              <a:rPr lang="en-US" b="1" dirty="0">
+                <a:solidFill>
+                  <a:srgbClr val="000000"/>
+                </a:solidFill>
+                <a:effectLst/>
+                <a:latin typeface="Hanken Grotesk" pitchFamily="2" charset="77"/>
+              </a:rPr>
+              <a:t> </a:t>
+            </a:r>
+            <a:r>
+              <a:rPr lang="en-US" dirty="0" err="1">
+                <a:solidFill>
+                  <a:srgbClr val="000000"/>
+                </a:solidFill>
+                <a:effectLst/>
+                <a:latin typeface="Hanken Grotesk" pitchFamily="2" charset="77"/>
+              </a:rPr>
+              <a:t>i</a:t>
+            </a:r>
+            <a:r>
+              <a:rPr lang="en-US" dirty="0">
+                <a:solidFill>
+                  <a:srgbClr val="000000"/>
+                </a:solidFill>
+                <a:effectLst/>
+                <a:latin typeface="Hanken Grotesk" pitchFamily="2" charset="77"/>
+              </a:rPr>
+              <a:t> </a:t>
+            </a:r>
+            <a:r>
+              <a:rPr lang="en-US" dirty="0" err="1">
+                <a:solidFill>
+                  <a:srgbClr val="000000"/>
+                </a:solidFill>
+                <a:effectLst/>
+                <a:latin typeface="Hanken Grotesk" pitchFamily="2" charset="77"/>
+              </a:rPr>
+              <a:t>efektywnie</a:t>
+            </a:r>
+            <a:r>
+              <a:rPr lang="en-US" dirty="0">
+                <a:solidFill>
+                  <a:srgbClr val="000000"/>
+                </a:solidFill>
+                <a:effectLst/>
+                <a:latin typeface="Hanken Grotesk" pitchFamily="2" charset="77"/>
+              </a:rPr>
+              <a:t> </a:t>
+            </a:r>
+            <a:r>
+              <a:rPr lang="en-US" dirty="0" err="1">
+                <a:solidFill>
+                  <a:srgbClr val="000000"/>
+                </a:solidFill>
+                <a:effectLst/>
+                <a:latin typeface="Hanken Grotesk" pitchFamily="2" charset="77"/>
+              </a:rPr>
+              <a:t>zarządzać</a:t>
+            </a:r>
+            <a:r>
+              <a:rPr lang="en-US" dirty="0">
+                <a:solidFill>
+                  <a:srgbClr val="000000"/>
+                </a:solidFill>
+                <a:effectLst/>
+                <a:latin typeface="Hanken Grotesk" pitchFamily="2" charset="77"/>
+              </a:rPr>
+              <a:t> </a:t>
+            </a:r>
+            <a:r>
+              <a:rPr lang="en-US" dirty="0" err="1">
+                <a:solidFill>
+                  <a:srgbClr val="000000"/>
+                </a:solidFill>
+                <a:effectLst/>
+                <a:latin typeface="Hanken Grotesk" pitchFamily="2" charset="77"/>
+              </a:rPr>
+              <a:t>swoim</a:t>
+            </a:r>
+            <a:r>
+              <a:rPr lang="en-US" dirty="0">
+                <a:solidFill>
+                  <a:srgbClr val="000000"/>
+                </a:solidFill>
+                <a:effectLst/>
+                <a:latin typeface="Hanken Grotesk" pitchFamily="2" charset="77"/>
+              </a:rPr>
+              <a:t> </a:t>
+            </a:r>
+            <a:r>
+              <a:rPr lang="en-US" dirty="0" err="1">
+                <a:solidFill>
+                  <a:srgbClr val="000000"/>
+                </a:solidFill>
+                <a:effectLst/>
+                <a:latin typeface="Hanken Grotesk" pitchFamily="2" charset="77"/>
+              </a:rPr>
+              <a:t>procesem</a:t>
+            </a:r>
+            <a:r>
+              <a:rPr lang="en-US" dirty="0">
+                <a:solidFill>
+                  <a:srgbClr val="000000"/>
+                </a:solidFill>
+                <a:effectLst/>
+                <a:latin typeface="Hanken Grotesk" pitchFamily="2" charset="77"/>
+              </a:rPr>
+              <a:t> </a:t>
+            </a:r>
+            <a:r>
+              <a:rPr lang="en-US" dirty="0" err="1">
+                <a:solidFill>
+                  <a:srgbClr val="000000"/>
+                </a:solidFill>
+                <a:effectLst/>
+                <a:latin typeface="Hanken Grotesk" pitchFamily="2" charset="77"/>
+              </a:rPr>
+              <a:t>nauki</a:t>
+            </a:r>
+            <a:r>
+              <a:rPr lang="en-US" dirty="0">
+                <a:solidFill>
+                  <a:srgbClr val="000000"/>
+                </a:solidFill>
+                <a:effectLst/>
+                <a:latin typeface="Hanken Grotesk" pitchFamily="2" charset="77"/>
+              </a:rPr>
+              <a:t>.</a:t>
+            </a:r>
+          </a:p>
+        </p:txBody>
+      </p:sp>
+    </p:spTree>
+    <p:extLst>
+      <p:ext uri="{BB962C8B-B14F-4D97-AF65-F5344CB8AC3E}">
+        <p14:creationId xmlns:p14="http://schemas.microsoft.com/office/powerpoint/2010/main" val="2219649856"/>
+      </p:ext>
+    </p:extLst>
+  </p:cSld>
+  <p:clrMapOvr>
+    <a:masterClrMapping/>
+  </p:clrMapOvr>
+</p:sld>
+</file>
+
+<file path=ppt/slides/slide20.xml><?xml version="1.0" encoding="utf-8"?>
 <p:sld xmlns:a="http://schemas.openxmlformats.org/drawingml/2006/main" xmlns:r="http://schemas.openxmlformats.org/officeDocument/2006/relationships" xmlns:p="http://schemas.openxmlformats.org/presentationml/2006/main">
   <p:cSld>
     <p:spTree>
@@ -12486,7 +15083,99 @@
 </p:sld>
 </file>
 
-<file path=ppt/slides/slide2.xml><?xml version="1.0" encoding="utf-8"?>
+<file path=ppt/slides/slide21.xml><?xml version="1.0" encoding="utf-8"?>
+<p:sld xmlns:a="http://schemas.openxmlformats.org/drawingml/2006/main" xmlns:r="http://schemas.openxmlformats.org/officeDocument/2006/relationships" xmlns:p="http://schemas.openxmlformats.org/presentationml/2006/main">
+  <p:cSld>
+    <p:spTree>
+      <p:nvGrpSpPr>
+        <p:cNvPr id="1" name="Shape 413">
+          <a:extLst>
+            <a:ext uri="{FF2B5EF4-FFF2-40B4-BE49-F238E27FC236}">
+              <a16:creationId xmlns:a16="http://schemas.microsoft.com/office/drawing/2014/main" id="{C43A1A52-94B1-C034-B357-DA166B264709}"/>
+            </a:ext>
+          </a:extLst>
+        </p:cNvPr>
+        <p:cNvGrpSpPr/>
+        <p:nvPr/>
+      </p:nvGrpSpPr>
+      <p:grpSpPr>
+        <a:xfrm>
+          <a:off x="0" y="0"/>
+          <a:ext cx="0" cy="0"/>
+          <a:chOff x="0" y="0"/>
+          <a:chExt cx="0" cy="0"/>
+        </a:xfrm>
+      </p:grpSpPr>
+      <p:sp>
+        <p:nvSpPr>
+          <p:cNvPr id="414" name="Google Shape;414;p43">
+            <a:extLst>
+              <a:ext uri="{FF2B5EF4-FFF2-40B4-BE49-F238E27FC236}">
+                <a16:creationId xmlns:a16="http://schemas.microsoft.com/office/drawing/2014/main" id="{03304025-0F32-C12D-3EA1-7F88D4DA9FB0}"/>
+              </a:ext>
+            </a:extLst>
+          </p:cNvPr>
+          <p:cNvSpPr txBox="1">
+            <a:spLocks noGrp="1"/>
+          </p:cNvSpPr>
+          <p:nvPr>
+            <p:ph type="title"/>
+          </p:nvPr>
+        </p:nvSpPr>
+        <p:spPr>
+          <a:xfrm>
+            <a:off x="1644450" y="1126941"/>
+            <a:ext cx="5855100" cy="1340903"/>
+          </a:xfrm>
+          <a:prstGeom prst="rect">
+            <a:avLst/>
+          </a:prstGeom>
+        </p:spPr>
+        <p:txBody>
+          <a:bodyPr spcFirstLastPara="1" wrap="square" lIns="91425" tIns="91425" rIns="91425" bIns="91425" anchor="b" anchorCtr="0">
+            <a:noAutofit/>
+          </a:bodyPr>
+          <a:lstStyle/>
+          <a:p>
+            <a:pPr marL="0" lvl="0" indent="0" algn="ctr" rtl="0">
+              <a:spcBef>
+                <a:spcPts val="0"/>
+              </a:spcBef>
+              <a:spcAft>
+                <a:spcPts val="0"/>
+              </a:spcAft>
+              <a:buNone/>
+            </a:pPr>
+            <a:r>
+              <a:rPr lang="en" dirty="0" err="1"/>
+              <a:t>Schemat</a:t>
+            </a:r>
+            <a:r>
+              <a:rPr lang="en" dirty="0"/>
+              <a:t> UML </a:t>
+            </a:r>
+            <a:r>
+              <a:rPr lang="en" dirty="0" err="1"/>
+              <a:t>Projektu</a:t>
+            </a:r>
+            <a:endParaRPr dirty="0"/>
+          </a:p>
+        </p:txBody>
+      </p:sp>
+    </p:spTree>
+    <p:extLst>
+      <p:ext uri="{BB962C8B-B14F-4D97-AF65-F5344CB8AC3E}">
+        <p14:creationId xmlns:p14="http://schemas.microsoft.com/office/powerpoint/2010/main" val="2844590691"/>
+      </p:ext>
+    </p:extLst>
+  </p:cSld>
+  <p:clrMapOvr>
+    <a:masterClrMapping/>
+  </p:clrMapOvr>
+</p:sld>
+</file>
+
+<file path=ppt/slides/slide3.xml><?xml version="1.0" encoding="utf-8"?>
 <p:sld xmlns:a="http://schemas.openxmlformats.org/drawingml/2006/main" xmlns:r="http://schemas.openxmlformats.org/officeDocument/2006/relationships" xmlns:p="http://schemas.openxmlformats.org/presentationml/2006/main">
   <p:cSld>
     <p:spTree>
@@ -13683,99 +16372,7 @@
 </p:sld>
 </file>
 
-<file path=ppt/slides/slide20.xml><?xml version="1.0" encoding="utf-8"?>
-<p:sld xmlns:a="http://schemas.openxmlformats.org/drawingml/2006/main" xmlns:r="http://schemas.openxmlformats.org/officeDocument/2006/relationships" xmlns:p="http://schemas.openxmlformats.org/presentationml/2006/main">
-  <p:cSld>
-    <p:spTree>
-      <p:nvGrpSpPr>
-        <p:cNvPr id="1" name="Shape 413">
-          <a:extLst>
-            <a:ext uri="{FF2B5EF4-FFF2-40B4-BE49-F238E27FC236}">
-              <a16:creationId xmlns:a16="http://schemas.microsoft.com/office/drawing/2014/main" id="{C43A1A52-94B1-C034-B357-DA166B264709}"/>
-            </a:ext>
-          </a:extLst>
-        </p:cNvPr>
-        <p:cNvGrpSpPr/>
-        <p:nvPr/>
-      </p:nvGrpSpPr>
-      <p:grpSpPr>
-        <a:xfrm>
-          <a:off x="0" y="0"/>
-          <a:ext cx="0" cy="0"/>
-          <a:chOff x="0" y="0"/>
-          <a:chExt cx="0" cy="0"/>
-        </a:xfrm>
-      </p:grpSpPr>
-      <p:sp>
-        <p:nvSpPr>
-          <p:cNvPr id="414" name="Google Shape;414;p43">
-            <a:extLst>
-              <a:ext uri="{FF2B5EF4-FFF2-40B4-BE49-F238E27FC236}">
-                <a16:creationId xmlns:a16="http://schemas.microsoft.com/office/drawing/2014/main" id="{03304025-0F32-C12D-3EA1-7F88D4DA9FB0}"/>
-              </a:ext>
-            </a:extLst>
-          </p:cNvPr>
-          <p:cNvSpPr txBox="1">
-            <a:spLocks noGrp="1"/>
-          </p:cNvSpPr>
-          <p:nvPr>
-            <p:ph type="title"/>
-          </p:nvPr>
-        </p:nvSpPr>
-        <p:spPr>
-          <a:xfrm>
-            <a:off x="1644450" y="1126941"/>
-            <a:ext cx="5855100" cy="1340903"/>
-          </a:xfrm>
-          <a:prstGeom prst="rect">
-            <a:avLst/>
-          </a:prstGeom>
-        </p:spPr>
-        <p:txBody>
-          <a:bodyPr spcFirstLastPara="1" wrap="square" lIns="91425" tIns="91425" rIns="91425" bIns="91425" anchor="b" anchorCtr="0">
-            <a:noAutofit/>
-          </a:bodyPr>
-          <a:lstStyle/>
-          <a:p>
-            <a:pPr marL="0" lvl="0" indent="0" algn="ctr" rtl="0">
-              <a:spcBef>
-                <a:spcPts val="0"/>
-              </a:spcBef>
-              <a:spcAft>
-                <a:spcPts val="0"/>
-              </a:spcAft>
-              <a:buNone/>
-            </a:pPr>
-            <a:r>
-              <a:rPr lang="en" dirty="0" err="1"/>
-              <a:t>Schemat</a:t>
-            </a:r>
-            <a:r>
-              <a:rPr lang="en" dirty="0"/>
-              <a:t> UML </a:t>
-            </a:r>
-            <a:r>
-              <a:rPr lang="en" dirty="0" err="1"/>
-              <a:t>Projektu</a:t>
-            </a:r>
-            <a:endParaRPr dirty="0"/>
-          </a:p>
-        </p:txBody>
-      </p:sp>
-    </p:spTree>
-    <p:extLst>
-      <p:ext uri="{BB962C8B-B14F-4D97-AF65-F5344CB8AC3E}">
-        <p14:creationId xmlns:p14="http://schemas.microsoft.com/office/powerpoint/2010/main" val="2844590691"/>
-      </p:ext>
-    </p:extLst>
-  </p:cSld>
-  <p:clrMapOvr>
-    <a:masterClrMapping/>
-  </p:clrMapOvr>
-</p:sld>
-</file>
-
-<file path=ppt/slides/slide3.xml><?xml version="1.0" encoding="utf-8"?>
+<file path=ppt/slides/slide4.xml><?xml version="1.0" encoding="utf-8"?>
 <p:sld xmlns:a="http://schemas.openxmlformats.org/drawingml/2006/main" xmlns:r="http://schemas.openxmlformats.org/officeDocument/2006/relationships" xmlns:p="http://schemas.openxmlformats.org/presentationml/2006/main">
   <p:cSld>
     <p:spTree>
@@ -13867,7 +16464,7 @@
 </p:sld>
 </file>
 
-<file path=ppt/slides/slide4.xml><?xml version="1.0" encoding="utf-8"?>
+<file path=ppt/slides/slide5.xml><?xml version="1.0" encoding="utf-8"?>
 <p:sld xmlns:a="http://schemas.openxmlformats.org/drawingml/2006/main" xmlns:r="http://schemas.openxmlformats.org/officeDocument/2006/relationships" xmlns:p="http://schemas.openxmlformats.org/presentationml/2006/main">
   <p:cSld>
     <p:spTree>
@@ -14746,7 +17343,7 @@
 </p:sld>
 </file>
 
-<file path=ppt/slides/slide5.xml><?xml version="1.0" encoding="utf-8"?>
+<file path=ppt/slides/slide6.xml><?xml version="1.0" encoding="utf-8"?>
 <p:sld xmlns:a="http://schemas.openxmlformats.org/drawingml/2006/main" xmlns:r="http://schemas.openxmlformats.org/officeDocument/2006/relationships" xmlns:p="http://schemas.openxmlformats.org/presentationml/2006/main">
   <p:cSld>
     <p:spTree>
@@ -14860,7 +17457,7 @@
 </p:sld>
 </file>
 
-<file path=ppt/slides/slide6.xml><?xml version="1.0" encoding="utf-8"?>
+<file path=ppt/slides/slide7.xml><?xml version="1.0" encoding="utf-8"?>
 <p:sld xmlns:a="http://schemas.openxmlformats.org/drawingml/2006/main" xmlns:r="http://schemas.openxmlformats.org/officeDocument/2006/relationships" xmlns:p="http://schemas.openxmlformats.org/presentationml/2006/main">
   <p:cSld>
     <p:spTree>
@@ -14974,7 +17571,7 @@
 </p:sld>
 </file>
 
-<file path=ppt/slides/slide7.xml><?xml version="1.0" encoding="utf-8"?>
+<file path=ppt/slides/slide8.xml><?xml version="1.0" encoding="utf-8"?>
 <p:sld xmlns:a="http://schemas.openxmlformats.org/drawingml/2006/main" xmlns:r="http://schemas.openxmlformats.org/officeDocument/2006/relationships" xmlns:p="http://schemas.openxmlformats.org/presentationml/2006/main">
   <p:cSld>
     <p:spTree>
@@ -15088,7 +17685,7 @@
 </p:sld>
 </file>
 
-<file path=ppt/slides/slide8.xml><?xml version="1.0" encoding="utf-8"?>
+<file path=ppt/slides/slide9.xml><?xml version="1.0" encoding="utf-8"?>
 <p:sld xmlns:a="http://schemas.openxmlformats.org/drawingml/2006/main" xmlns:r="http://schemas.openxmlformats.org/officeDocument/2006/relationships" xmlns:p="http://schemas.openxmlformats.org/presentationml/2006/main">
   <p:cSld>
     <p:spTree>
@@ -15898,72 +18495,6 @@
     <p:extLst>
       <p:ext uri="{BB962C8B-B14F-4D97-AF65-F5344CB8AC3E}">
         <p14:creationId xmlns:p14="http://schemas.microsoft.com/office/powerpoint/2010/main" val="3130672623"/>
-      </p:ext>
-    </p:extLst>
-  </p:cSld>
-  <p:clrMapOvr>
-    <a:masterClrMapping/>
-  </p:clrMapOvr>
-</p:sld>
-</file>
-
-<file path=ppt/slides/slide9.xml><?xml version="1.0" encoding="utf-8"?>
-<p:sld xmlns:a="http://schemas.openxmlformats.org/drawingml/2006/main" xmlns:r="http://schemas.openxmlformats.org/officeDocument/2006/relationships" xmlns:p="http://schemas.openxmlformats.org/presentationml/2006/main">
-  <p:cSld>
-    <p:spTree>
-      <p:nvGrpSpPr>
-        <p:cNvPr id="1" name="Shape 594">
-          <a:extLst>
-            <a:ext uri="{FF2B5EF4-FFF2-40B4-BE49-F238E27FC236}">
-              <a16:creationId xmlns:a16="http://schemas.microsoft.com/office/drawing/2014/main" id="{B013FC76-882F-3444-97EF-A6AF89B0CFBD}"/>
-            </a:ext>
-          </a:extLst>
-        </p:cNvPr>
-        <p:cNvGrpSpPr/>
-        <p:nvPr/>
-      </p:nvGrpSpPr>
-      <p:grpSpPr>
-        <a:xfrm>
-          <a:off x="0" y="0"/>
-          <a:ext cx="0" cy="0"/>
-          <a:chOff x="0" y="0"/>
-          <a:chExt cx="0" cy="0"/>
-        </a:xfrm>
-      </p:grpSpPr>
-      <p:pic>
-        <p:nvPicPr>
-          <p:cNvPr id="8" name="Picture 7" descr="A screenshot of a computer&#10;&#10;Description automatically generated">
-            <a:extLst>
-              <a:ext uri="{FF2B5EF4-FFF2-40B4-BE49-F238E27FC236}">
-                <a16:creationId xmlns:a16="http://schemas.microsoft.com/office/drawing/2014/main" id="{56926993-6410-1566-3AD4-1C0C632DAEBD}"/>
-              </a:ext>
-            </a:extLst>
-          </p:cNvPr>
-          <p:cNvPicPr>
-            <a:picLocks noChangeAspect="1"/>
-          </p:cNvPicPr>
-          <p:nvPr/>
-        </p:nvPicPr>
-        <p:blipFill>
-          <a:blip r:embed="rId3"/>
-          <a:stretch>
-            <a:fillRect/>
-          </a:stretch>
-        </p:blipFill>
-        <p:spPr>
-          <a:xfrm>
-            <a:off x="276947" y="1158188"/>
-            <a:ext cx="8590105" cy="2827123"/>
-          </a:xfrm>
-          <a:prstGeom prst="rect">
-            <a:avLst/>
-          </a:prstGeom>
-        </p:spPr>
-      </p:pic>
-    </p:spTree>
-    <p:extLst>
-      <p:ext uri="{BB962C8B-B14F-4D97-AF65-F5344CB8AC3E}">
-        <p14:creationId xmlns:p14="http://schemas.microsoft.com/office/powerpoint/2010/main" val="3028487865"/>
       </p:ext>
     </p:extLst>
   </p:cSld>

</xml_diff>